<commit_message>
Updated Positions of TimerWindow Elements for the new Background Image
</commit_message>
<xml_diff>
--- a/HourGlass/Assets/Präsentation2.pptx
+++ b/HourGlass/Assets/Präsentation2.pptx
@@ -2,18 +2,18 @@
 <file path=ppt/presentation.xml><?xml version="1.0" encoding="utf-8"?>
 <p:presentation xmlns:a="http://schemas.openxmlformats.org/drawingml/2006/main" xmlns:r="http://schemas.openxmlformats.org/officeDocument/2006/relationships" xmlns:p="http://schemas.openxmlformats.org/presentationml/2006/main" saveSubsetFonts="1">
   <p:sldMasterIdLst>
-    <p:sldMasterId id="2147483648" r:id="rId1"/>
+    <p:sldMasterId id="2147483660" r:id="rId1"/>
   </p:sldMasterIdLst>
   <p:sldIdLst>
     <p:sldId id="256" r:id="rId2"/>
   </p:sldIdLst>
-  <p:sldSz cx="12192000" cy="6858000"/>
+  <p:sldSz cx="12192000" cy="7199313"/>
   <p:notesSz cx="6858000" cy="9144000"/>
   <p:defaultTextStyle>
     <a:defPPr>
-      <a:defRPr lang="de-DE"/>
+      <a:defRPr lang="en-US"/>
     </a:defPPr>
-    <a:lvl1pPr marL="0" algn="l" defTabSz="914400" rtl="0" eaLnBrk="1" latinLnBrk="0" hangingPunct="1">
+    <a:lvl1pPr marL="0" algn="l" defTabSz="457200" rtl="0" eaLnBrk="1" latinLnBrk="0" hangingPunct="1">
       <a:defRPr sz="1800" kern="1200">
         <a:solidFill>
           <a:schemeClr val="tx1"/>
@@ -23,7 +23,7 @@
         <a:cs typeface="+mn-cs"/>
       </a:defRPr>
     </a:lvl1pPr>
-    <a:lvl2pPr marL="457200" algn="l" defTabSz="914400" rtl="0" eaLnBrk="1" latinLnBrk="0" hangingPunct="1">
+    <a:lvl2pPr marL="457200" algn="l" defTabSz="457200" rtl="0" eaLnBrk="1" latinLnBrk="0" hangingPunct="1">
       <a:defRPr sz="1800" kern="1200">
         <a:solidFill>
           <a:schemeClr val="tx1"/>
@@ -33,7 +33,7 @@
         <a:cs typeface="+mn-cs"/>
       </a:defRPr>
     </a:lvl2pPr>
-    <a:lvl3pPr marL="914400" algn="l" defTabSz="914400" rtl="0" eaLnBrk="1" latinLnBrk="0" hangingPunct="1">
+    <a:lvl3pPr marL="914400" algn="l" defTabSz="457200" rtl="0" eaLnBrk="1" latinLnBrk="0" hangingPunct="1">
       <a:defRPr sz="1800" kern="1200">
         <a:solidFill>
           <a:schemeClr val="tx1"/>
@@ -43,7 +43,7 @@
         <a:cs typeface="+mn-cs"/>
       </a:defRPr>
     </a:lvl3pPr>
-    <a:lvl4pPr marL="1371600" algn="l" defTabSz="914400" rtl="0" eaLnBrk="1" latinLnBrk="0" hangingPunct="1">
+    <a:lvl4pPr marL="1371600" algn="l" defTabSz="457200" rtl="0" eaLnBrk="1" latinLnBrk="0" hangingPunct="1">
       <a:defRPr sz="1800" kern="1200">
         <a:solidFill>
           <a:schemeClr val="tx1"/>
@@ -53,7 +53,7 @@
         <a:cs typeface="+mn-cs"/>
       </a:defRPr>
     </a:lvl4pPr>
-    <a:lvl5pPr marL="1828800" algn="l" defTabSz="914400" rtl="0" eaLnBrk="1" latinLnBrk="0" hangingPunct="1">
+    <a:lvl5pPr marL="1828800" algn="l" defTabSz="457200" rtl="0" eaLnBrk="1" latinLnBrk="0" hangingPunct="1">
       <a:defRPr sz="1800" kern="1200">
         <a:solidFill>
           <a:schemeClr val="tx1"/>
@@ -63,7 +63,7 @@
         <a:cs typeface="+mn-cs"/>
       </a:defRPr>
     </a:lvl5pPr>
-    <a:lvl6pPr marL="2286000" algn="l" defTabSz="914400" rtl="0" eaLnBrk="1" latinLnBrk="0" hangingPunct="1">
+    <a:lvl6pPr marL="2286000" algn="l" defTabSz="457200" rtl="0" eaLnBrk="1" latinLnBrk="0" hangingPunct="1">
       <a:defRPr sz="1800" kern="1200">
         <a:solidFill>
           <a:schemeClr val="tx1"/>
@@ -73,7 +73,7 @@
         <a:cs typeface="+mn-cs"/>
       </a:defRPr>
     </a:lvl6pPr>
-    <a:lvl7pPr marL="2743200" algn="l" defTabSz="914400" rtl="0" eaLnBrk="1" latinLnBrk="0" hangingPunct="1">
+    <a:lvl7pPr marL="2743200" algn="l" defTabSz="457200" rtl="0" eaLnBrk="1" latinLnBrk="0" hangingPunct="1">
       <a:defRPr sz="1800" kern="1200">
         <a:solidFill>
           <a:schemeClr val="tx1"/>
@@ -83,7 +83,7 @@
         <a:cs typeface="+mn-cs"/>
       </a:defRPr>
     </a:lvl7pPr>
-    <a:lvl8pPr marL="3200400" algn="l" defTabSz="914400" rtl="0" eaLnBrk="1" latinLnBrk="0" hangingPunct="1">
+    <a:lvl8pPr marL="3200400" algn="l" defTabSz="457200" rtl="0" eaLnBrk="1" latinLnBrk="0" hangingPunct="1">
       <a:defRPr sz="1800" kern="1200">
         <a:solidFill>
           <a:schemeClr val="tx1"/>
@@ -93,7 +93,7 @@
         <a:cs typeface="+mn-cs"/>
       </a:defRPr>
     </a:lvl8pPr>
-    <a:lvl9pPr marL="3657600" algn="l" defTabSz="914400" rtl="0" eaLnBrk="1" latinLnBrk="0" hangingPunct="1">
+    <a:lvl9pPr marL="3657600" algn="l" defTabSz="457200" rtl="0" eaLnBrk="1" latinLnBrk="0" hangingPunct="1">
       <a:defRPr sz="1800" kern="1200">
         <a:solidFill>
           <a:schemeClr val="tx1"/>
@@ -131,13 +131,7 @@
       </p:grpSpPr>
       <p:sp>
         <p:nvSpPr>
-          <p:cNvPr id="2" name="Titel 1">
-            <a:extLst>
-              <a:ext uri="{FF2B5EF4-FFF2-40B4-BE49-F238E27FC236}">
-                <a16:creationId xmlns:a16="http://schemas.microsoft.com/office/drawing/2014/main" id="{351F869A-F58C-F820-1A14-15E5116FF740}"/>
-              </a:ext>
-            </a:extLst>
-          </p:cNvPr>
+          <p:cNvPr id="2" name="Title 1"/>
           <p:cNvSpPr>
             <a:spLocks noGrp="1"/>
           </p:cNvSpPr>
@@ -147,8 +141,8 @@
         </p:nvSpPr>
         <p:spPr>
           <a:xfrm>
-            <a:off x="1524000" y="1122363"/>
-            <a:ext cx="9144000" cy="2387600"/>
+            <a:off x="1524000" y="1178222"/>
+            <a:ext cx="9144000" cy="2506427"/>
           </a:xfrm>
         </p:spPr>
         <p:txBody>
@@ -163,18 +157,13 @@
               <a:rPr lang="de-DE"/>
               <a:t>Mastertitelformat bearbeiten</a:t>
             </a:r>
+            <a:endParaRPr lang="en-US" dirty="0"/>
           </a:p>
         </p:txBody>
       </p:sp>
       <p:sp>
         <p:nvSpPr>
-          <p:cNvPr id="3" name="Untertitel 2">
-            <a:extLst>
-              <a:ext uri="{FF2B5EF4-FFF2-40B4-BE49-F238E27FC236}">
-                <a16:creationId xmlns:a16="http://schemas.microsoft.com/office/drawing/2014/main" id="{6ED65FDE-FB32-86F9-838F-C36338BF9334}"/>
-              </a:ext>
-            </a:extLst>
-          </p:cNvPr>
+          <p:cNvPr id="3" name="Subtitle 2"/>
           <p:cNvSpPr>
             <a:spLocks noGrp="1"/>
           </p:cNvSpPr>
@@ -184,8 +173,8 @@
         </p:nvSpPr>
         <p:spPr>
           <a:xfrm>
-            <a:off x="1524000" y="3602038"/>
-            <a:ext cx="9144000" cy="1655762"/>
+            <a:off x="1524000" y="3781306"/>
+            <a:ext cx="9144000" cy="1738167"/>
           </a:xfrm>
         </p:spPr>
         <p:txBody>
@@ -233,18 +222,13 @@
               <a:rPr lang="de-DE"/>
               <a:t>Master-Untertitelformat bearbeiten</a:t>
             </a:r>
+            <a:endParaRPr lang="en-US" dirty="0"/>
           </a:p>
         </p:txBody>
       </p:sp>
       <p:sp>
         <p:nvSpPr>
-          <p:cNvPr id="4" name="Datumsplatzhalter 3">
-            <a:extLst>
-              <a:ext uri="{FF2B5EF4-FFF2-40B4-BE49-F238E27FC236}">
-                <a16:creationId xmlns:a16="http://schemas.microsoft.com/office/drawing/2014/main" id="{214DC1C7-C777-3B4C-F172-A923A18AC3A7}"/>
-              </a:ext>
-            </a:extLst>
-          </p:cNvPr>
+          <p:cNvPr id="4" name="Date Placeholder 3"/>
           <p:cNvSpPr>
             <a:spLocks noGrp="1"/>
           </p:cNvSpPr>
@@ -259,7 +243,7 @@
           <a:p>
             <a:fld id="{883ECEF7-B6E9-49C4-83BF-168FC5D45A15}" type="datetimeFigureOut">
               <a:rPr lang="de-DE" smtClean="0"/>
-              <a:t>22.08.2025</a:t>
+              <a:t>24.08.2025</a:t>
             </a:fld>
             <a:endParaRPr lang="de-DE"/>
           </a:p>
@@ -267,13 +251,7 @@
       </p:sp>
       <p:sp>
         <p:nvSpPr>
-          <p:cNvPr id="5" name="Fußzeilenplatzhalter 4">
-            <a:extLst>
-              <a:ext uri="{FF2B5EF4-FFF2-40B4-BE49-F238E27FC236}">
-                <a16:creationId xmlns:a16="http://schemas.microsoft.com/office/drawing/2014/main" id="{2A98C9A1-4134-F545-F5DB-220E7C077E3D}"/>
-              </a:ext>
-            </a:extLst>
-          </p:cNvPr>
+          <p:cNvPr id="5" name="Footer Placeholder 4"/>
           <p:cNvSpPr>
             <a:spLocks noGrp="1"/>
           </p:cNvSpPr>
@@ -292,13 +270,7 @@
       </p:sp>
       <p:sp>
         <p:nvSpPr>
-          <p:cNvPr id="6" name="Foliennummernplatzhalter 5">
-            <a:extLst>
-              <a:ext uri="{FF2B5EF4-FFF2-40B4-BE49-F238E27FC236}">
-                <a16:creationId xmlns:a16="http://schemas.microsoft.com/office/drawing/2014/main" id="{3805EE29-9D75-2FB0-F91D-D470C85095FD}"/>
-              </a:ext>
-            </a:extLst>
-          </p:cNvPr>
+          <p:cNvPr id="6" name="Slide Number Placeholder 5"/>
           <p:cNvSpPr>
             <a:spLocks noGrp="1"/>
           </p:cNvSpPr>
@@ -322,7 +294,7 @@
     </p:spTree>
     <p:extLst>
       <p:ext uri="{BB962C8B-B14F-4D97-AF65-F5344CB8AC3E}">
-        <p14:creationId xmlns:p14="http://schemas.microsoft.com/office/powerpoint/2010/main" val="2527893610"/>
+        <p14:creationId xmlns:p14="http://schemas.microsoft.com/office/powerpoint/2010/main" val="4059946846"/>
       </p:ext>
     </p:extLst>
   </p:cSld>
@@ -351,13 +323,7 @@
       </p:grpSpPr>
       <p:sp>
         <p:nvSpPr>
-          <p:cNvPr id="2" name="Titel 1">
-            <a:extLst>
-              <a:ext uri="{FF2B5EF4-FFF2-40B4-BE49-F238E27FC236}">
-                <a16:creationId xmlns:a16="http://schemas.microsoft.com/office/drawing/2014/main" id="{24BA67FC-BFD3-D737-212A-CFF858871615}"/>
-              </a:ext>
-            </a:extLst>
-          </p:cNvPr>
+          <p:cNvPr id="2" name="Title 1"/>
           <p:cNvSpPr>
             <a:spLocks noGrp="1"/>
           </p:cNvSpPr>
@@ -374,18 +340,13 @@
               <a:rPr lang="de-DE"/>
               <a:t>Mastertitelformat bearbeiten</a:t>
             </a:r>
+            <a:endParaRPr lang="en-US" dirty="0"/>
           </a:p>
         </p:txBody>
       </p:sp>
       <p:sp>
         <p:nvSpPr>
-          <p:cNvPr id="3" name="Vertikaler Textplatzhalter 2">
-            <a:extLst>
-              <a:ext uri="{FF2B5EF4-FFF2-40B4-BE49-F238E27FC236}">
-                <a16:creationId xmlns:a16="http://schemas.microsoft.com/office/drawing/2014/main" id="{0B2C258F-F914-1CF4-8FCC-5ED33434987E}"/>
-              </a:ext>
-            </a:extLst>
-          </p:cNvPr>
+          <p:cNvPr id="3" name="Vertical Text Placeholder 2"/>
           <p:cNvSpPr>
             <a:spLocks noGrp="1"/>
           </p:cNvSpPr>
@@ -431,18 +392,13 @@
               <a:rPr lang="de-DE"/>
               <a:t>Fünfte Ebene</a:t>
             </a:r>
+            <a:endParaRPr lang="en-US" dirty="0"/>
           </a:p>
         </p:txBody>
       </p:sp>
       <p:sp>
         <p:nvSpPr>
-          <p:cNvPr id="4" name="Datumsplatzhalter 3">
-            <a:extLst>
-              <a:ext uri="{FF2B5EF4-FFF2-40B4-BE49-F238E27FC236}">
-                <a16:creationId xmlns:a16="http://schemas.microsoft.com/office/drawing/2014/main" id="{60EE5140-2D78-764F-4646-E31F2936C8FB}"/>
-              </a:ext>
-            </a:extLst>
-          </p:cNvPr>
+          <p:cNvPr id="4" name="Date Placeholder 3"/>
           <p:cNvSpPr>
             <a:spLocks noGrp="1"/>
           </p:cNvSpPr>
@@ -457,7 +413,7 @@
           <a:p>
             <a:fld id="{883ECEF7-B6E9-49C4-83BF-168FC5D45A15}" type="datetimeFigureOut">
               <a:rPr lang="de-DE" smtClean="0"/>
-              <a:t>22.08.2025</a:t>
+              <a:t>24.08.2025</a:t>
             </a:fld>
             <a:endParaRPr lang="de-DE"/>
           </a:p>
@@ -465,13 +421,7 @@
       </p:sp>
       <p:sp>
         <p:nvSpPr>
-          <p:cNvPr id="5" name="Fußzeilenplatzhalter 4">
-            <a:extLst>
-              <a:ext uri="{FF2B5EF4-FFF2-40B4-BE49-F238E27FC236}">
-                <a16:creationId xmlns:a16="http://schemas.microsoft.com/office/drawing/2014/main" id="{E8D66D6B-3E5D-8697-A73A-66256BDA306D}"/>
-              </a:ext>
-            </a:extLst>
-          </p:cNvPr>
+          <p:cNvPr id="5" name="Footer Placeholder 4"/>
           <p:cNvSpPr>
             <a:spLocks noGrp="1"/>
           </p:cNvSpPr>
@@ -490,13 +440,7 @@
       </p:sp>
       <p:sp>
         <p:nvSpPr>
-          <p:cNvPr id="6" name="Foliennummernplatzhalter 5">
-            <a:extLst>
-              <a:ext uri="{FF2B5EF4-FFF2-40B4-BE49-F238E27FC236}">
-                <a16:creationId xmlns:a16="http://schemas.microsoft.com/office/drawing/2014/main" id="{07CB9B48-5966-87FD-5799-ACA604642682}"/>
-              </a:ext>
-            </a:extLst>
-          </p:cNvPr>
+          <p:cNvPr id="6" name="Slide Number Placeholder 5"/>
           <p:cNvSpPr>
             <a:spLocks noGrp="1"/>
           </p:cNvSpPr>
@@ -520,7 +464,7 @@
     </p:spTree>
     <p:extLst>
       <p:ext uri="{BB962C8B-B14F-4D97-AF65-F5344CB8AC3E}">
-        <p14:creationId xmlns:p14="http://schemas.microsoft.com/office/powerpoint/2010/main" val="3582836429"/>
+        <p14:creationId xmlns:p14="http://schemas.microsoft.com/office/powerpoint/2010/main" val="2634607253"/>
       </p:ext>
     </p:extLst>
   </p:cSld>
@@ -549,13 +493,7 @@
       </p:grpSpPr>
       <p:sp>
         <p:nvSpPr>
-          <p:cNvPr id="2" name="Vertikaler Titel 1">
-            <a:extLst>
-              <a:ext uri="{FF2B5EF4-FFF2-40B4-BE49-F238E27FC236}">
-                <a16:creationId xmlns:a16="http://schemas.microsoft.com/office/drawing/2014/main" id="{A0A04AC7-37DA-B1BC-52A0-6862598D4F7B}"/>
-              </a:ext>
-            </a:extLst>
-          </p:cNvPr>
+          <p:cNvPr id="2" name="Vertical Title 1"/>
           <p:cNvSpPr>
             <a:spLocks noGrp="1"/>
           </p:cNvSpPr>
@@ -565,8 +503,8 @@
         </p:nvSpPr>
         <p:spPr>
           <a:xfrm>
-            <a:off x="8724900" y="365125"/>
-            <a:ext cx="2628900" cy="5811838"/>
+            <a:off x="8724900" y="383297"/>
+            <a:ext cx="2628900" cy="6101085"/>
           </a:xfrm>
         </p:spPr>
         <p:txBody>
@@ -577,18 +515,13 @@
               <a:rPr lang="de-DE"/>
               <a:t>Mastertitelformat bearbeiten</a:t>
             </a:r>
+            <a:endParaRPr lang="en-US" dirty="0"/>
           </a:p>
         </p:txBody>
       </p:sp>
       <p:sp>
         <p:nvSpPr>
-          <p:cNvPr id="3" name="Vertikaler Textplatzhalter 2">
-            <a:extLst>
-              <a:ext uri="{FF2B5EF4-FFF2-40B4-BE49-F238E27FC236}">
-                <a16:creationId xmlns:a16="http://schemas.microsoft.com/office/drawing/2014/main" id="{42F189A8-75D1-9978-E87C-C9DFEAE3DF99}"/>
-              </a:ext>
-            </a:extLst>
-          </p:cNvPr>
+          <p:cNvPr id="3" name="Vertical Text Placeholder 2"/>
           <p:cNvSpPr>
             <a:spLocks noGrp="1"/>
           </p:cNvSpPr>
@@ -598,8 +531,8 @@
         </p:nvSpPr>
         <p:spPr>
           <a:xfrm>
-            <a:off x="838200" y="365125"/>
-            <a:ext cx="7734300" cy="5811838"/>
+            <a:off x="838200" y="383297"/>
+            <a:ext cx="7734300" cy="6101085"/>
           </a:xfrm>
         </p:spPr>
         <p:txBody>
@@ -639,18 +572,13 @@
               <a:rPr lang="de-DE"/>
               <a:t>Fünfte Ebene</a:t>
             </a:r>
+            <a:endParaRPr lang="en-US" dirty="0"/>
           </a:p>
         </p:txBody>
       </p:sp>
       <p:sp>
         <p:nvSpPr>
-          <p:cNvPr id="4" name="Datumsplatzhalter 3">
-            <a:extLst>
-              <a:ext uri="{FF2B5EF4-FFF2-40B4-BE49-F238E27FC236}">
-                <a16:creationId xmlns:a16="http://schemas.microsoft.com/office/drawing/2014/main" id="{98921CC6-851F-A9EE-0F8E-94E25367D1A5}"/>
-              </a:ext>
-            </a:extLst>
-          </p:cNvPr>
+          <p:cNvPr id="4" name="Date Placeholder 3"/>
           <p:cNvSpPr>
             <a:spLocks noGrp="1"/>
           </p:cNvSpPr>
@@ -665,7 +593,7 @@
           <a:p>
             <a:fld id="{883ECEF7-B6E9-49C4-83BF-168FC5D45A15}" type="datetimeFigureOut">
               <a:rPr lang="de-DE" smtClean="0"/>
-              <a:t>22.08.2025</a:t>
+              <a:t>24.08.2025</a:t>
             </a:fld>
             <a:endParaRPr lang="de-DE"/>
           </a:p>
@@ -673,13 +601,7 @@
       </p:sp>
       <p:sp>
         <p:nvSpPr>
-          <p:cNvPr id="5" name="Fußzeilenplatzhalter 4">
-            <a:extLst>
-              <a:ext uri="{FF2B5EF4-FFF2-40B4-BE49-F238E27FC236}">
-                <a16:creationId xmlns:a16="http://schemas.microsoft.com/office/drawing/2014/main" id="{5367CD2A-AAFD-7250-7B2C-63C899815458}"/>
-              </a:ext>
-            </a:extLst>
-          </p:cNvPr>
+          <p:cNvPr id="5" name="Footer Placeholder 4"/>
           <p:cNvSpPr>
             <a:spLocks noGrp="1"/>
           </p:cNvSpPr>
@@ -698,13 +620,7 @@
       </p:sp>
       <p:sp>
         <p:nvSpPr>
-          <p:cNvPr id="6" name="Foliennummernplatzhalter 5">
-            <a:extLst>
-              <a:ext uri="{FF2B5EF4-FFF2-40B4-BE49-F238E27FC236}">
-                <a16:creationId xmlns:a16="http://schemas.microsoft.com/office/drawing/2014/main" id="{DE48B050-DF47-AB29-5142-C665FADFEC95}"/>
-              </a:ext>
-            </a:extLst>
-          </p:cNvPr>
+          <p:cNvPr id="6" name="Slide Number Placeholder 5"/>
           <p:cNvSpPr>
             <a:spLocks noGrp="1"/>
           </p:cNvSpPr>
@@ -728,7 +644,7 @@
     </p:spTree>
     <p:extLst>
       <p:ext uri="{BB962C8B-B14F-4D97-AF65-F5344CB8AC3E}">
-        <p14:creationId xmlns:p14="http://schemas.microsoft.com/office/powerpoint/2010/main" val="2469141902"/>
+        <p14:creationId xmlns:p14="http://schemas.microsoft.com/office/powerpoint/2010/main" val="1816462468"/>
       </p:ext>
     </p:extLst>
   </p:cSld>
@@ -757,13 +673,7 @@
       </p:grpSpPr>
       <p:sp>
         <p:nvSpPr>
-          <p:cNvPr id="2" name="Titel 1">
-            <a:extLst>
-              <a:ext uri="{FF2B5EF4-FFF2-40B4-BE49-F238E27FC236}">
-                <a16:creationId xmlns:a16="http://schemas.microsoft.com/office/drawing/2014/main" id="{024B4B12-1E63-7468-B107-2473FE27948F}"/>
-              </a:ext>
-            </a:extLst>
-          </p:cNvPr>
+          <p:cNvPr id="2" name="Title 1"/>
           <p:cNvSpPr>
             <a:spLocks noGrp="1"/>
           </p:cNvSpPr>
@@ -780,18 +690,13 @@
               <a:rPr lang="de-DE"/>
               <a:t>Mastertitelformat bearbeiten</a:t>
             </a:r>
+            <a:endParaRPr lang="en-US" dirty="0"/>
           </a:p>
         </p:txBody>
       </p:sp>
       <p:sp>
         <p:nvSpPr>
-          <p:cNvPr id="3" name="Inhaltsplatzhalter 2">
-            <a:extLst>
-              <a:ext uri="{FF2B5EF4-FFF2-40B4-BE49-F238E27FC236}">
-                <a16:creationId xmlns:a16="http://schemas.microsoft.com/office/drawing/2014/main" id="{D8D94C36-2269-E7E2-4B89-89E04C555A40}"/>
-              </a:ext>
-            </a:extLst>
-          </p:cNvPr>
+          <p:cNvPr id="3" name="Content Placeholder 2"/>
           <p:cNvSpPr>
             <a:spLocks noGrp="1"/>
           </p:cNvSpPr>
@@ -837,18 +742,13 @@
               <a:rPr lang="de-DE"/>
               <a:t>Fünfte Ebene</a:t>
             </a:r>
+            <a:endParaRPr lang="en-US" dirty="0"/>
           </a:p>
         </p:txBody>
       </p:sp>
       <p:sp>
         <p:nvSpPr>
-          <p:cNvPr id="4" name="Datumsplatzhalter 3">
-            <a:extLst>
-              <a:ext uri="{FF2B5EF4-FFF2-40B4-BE49-F238E27FC236}">
-                <a16:creationId xmlns:a16="http://schemas.microsoft.com/office/drawing/2014/main" id="{4F8B7BAE-E6FE-5CA0-02F8-427EFA83AFEE}"/>
-              </a:ext>
-            </a:extLst>
-          </p:cNvPr>
+          <p:cNvPr id="4" name="Date Placeholder 3"/>
           <p:cNvSpPr>
             <a:spLocks noGrp="1"/>
           </p:cNvSpPr>
@@ -863,7 +763,7 @@
           <a:p>
             <a:fld id="{883ECEF7-B6E9-49C4-83BF-168FC5D45A15}" type="datetimeFigureOut">
               <a:rPr lang="de-DE" smtClean="0"/>
-              <a:t>22.08.2025</a:t>
+              <a:t>24.08.2025</a:t>
             </a:fld>
             <a:endParaRPr lang="de-DE"/>
           </a:p>
@@ -871,13 +771,7 @@
       </p:sp>
       <p:sp>
         <p:nvSpPr>
-          <p:cNvPr id="5" name="Fußzeilenplatzhalter 4">
-            <a:extLst>
-              <a:ext uri="{FF2B5EF4-FFF2-40B4-BE49-F238E27FC236}">
-                <a16:creationId xmlns:a16="http://schemas.microsoft.com/office/drawing/2014/main" id="{078A6A1B-D495-EF39-DB6B-5A66E9D96CE7}"/>
-              </a:ext>
-            </a:extLst>
-          </p:cNvPr>
+          <p:cNvPr id="5" name="Footer Placeholder 4"/>
           <p:cNvSpPr>
             <a:spLocks noGrp="1"/>
           </p:cNvSpPr>
@@ -896,13 +790,7 @@
       </p:sp>
       <p:sp>
         <p:nvSpPr>
-          <p:cNvPr id="6" name="Foliennummernplatzhalter 5">
-            <a:extLst>
-              <a:ext uri="{FF2B5EF4-FFF2-40B4-BE49-F238E27FC236}">
-                <a16:creationId xmlns:a16="http://schemas.microsoft.com/office/drawing/2014/main" id="{B2BC42C9-FCC9-48C2-1A8E-A880FF1E8B92}"/>
-              </a:ext>
-            </a:extLst>
-          </p:cNvPr>
+          <p:cNvPr id="6" name="Slide Number Placeholder 5"/>
           <p:cNvSpPr>
             <a:spLocks noGrp="1"/>
           </p:cNvSpPr>
@@ -926,7 +814,7 @@
     </p:spTree>
     <p:extLst>
       <p:ext uri="{BB962C8B-B14F-4D97-AF65-F5344CB8AC3E}">
-        <p14:creationId xmlns:p14="http://schemas.microsoft.com/office/powerpoint/2010/main" val="2121432894"/>
+        <p14:creationId xmlns:p14="http://schemas.microsoft.com/office/powerpoint/2010/main" val="2686273502"/>
       </p:ext>
     </p:extLst>
   </p:cSld>
@@ -955,13 +843,7 @@
       </p:grpSpPr>
       <p:sp>
         <p:nvSpPr>
-          <p:cNvPr id="2" name="Titel 1">
-            <a:extLst>
-              <a:ext uri="{FF2B5EF4-FFF2-40B4-BE49-F238E27FC236}">
-                <a16:creationId xmlns:a16="http://schemas.microsoft.com/office/drawing/2014/main" id="{573F6E68-149C-4334-91B3-DB956502927E}"/>
-              </a:ext>
-            </a:extLst>
-          </p:cNvPr>
+          <p:cNvPr id="2" name="Title 1"/>
           <p:cNvSpPr>
             <a:spLocks noGrp="1"/>
           </p:cNvSpPr>
@@ -971,8 +853,8 @@
         </p:nvSpPr>
         <p:spPr>
           <a:xfrm>
-            <a:off x="831850" y="1709738"/>
-            <a:ext cx="10515600" cy="2852737"/>
+            <a:off x="831850" y="1794830"/>
+            <a:ext cx="10515600" cy="2994714"/>
           </a:xfrm>
         </p:spPr>
         <p:txBody>
@@ -987,18 +869,13 @@
               <a:rPr lang="de-DE"/>
               <a:t>Mastertitelformat bearbeiten</a:t>
             </a:r>
+            <a:endParaRPr lang="en-US" dirty="0"/>
           </a:p>
         </p:txBody>
       </p:sp>
       <p:sp>
         <p:nvSpPr>
-          <p:cNvPr id="3" name="Textplatzhalter 2">
-            <a:extLst>
-              <a:ext uri="{FF2B5EF4-FFF2-40B4-BE49-F238E27FC236}">
-                <a16:creationId xmlns:a16="http://schemas.microsoft.com/office/drawing/2014/main" id="{FD89079C-DCFD-48EB-9A99-B49CE40C3A56}"/>
-              </a:ext>
-            </a:extLst>
-          </p:cNvPr>
+          <p:cNvPr id="3" name="Text Placeholder 2"/>
           <p:cNvSpPr>
             <a:spLocks noGrp="1"/>
           </p:cNvSpPr>
@@ -1008,8 +885,8 @@
         </p:nvSpPr>
         <p:spPr>
           <a:xfrm>
-            <a:off x="831850" y="4589463"/>
-            <a:ext cx="10515600" cy="1500187"/>
+            <a:off x="831850" y="4817875"/>
+            <a:ext cx="10515600" cy="1574849"/>
           </a:xfrm>
         </p:spPr>
         <p:txBody>
@@ -1117,13 +994,7 @@
       </p:sp>
       <p:sp>
         <p:nvSpPr>
-          <p:cNvPr id="4" name="Datumsplatzhalter 3">
-            <a:extLst>
-              <a:ext uri="{FF2B5EF4-FFF2-40B4-BE49-F238E27FC236}">
-                <a16:creationId xmlns:a16="http://schemas.microsoft.com/office/drawing/2014/main" id="{83864E07-476E-1B9F-3492-0CBE2292BD71}"/>
-              </a:ext>
-            </a:extLst>
-          </p:cNvPr>
+          <p:cNvPr id="4" name="Date Placeholder 3"/>
           <p:cNvSpPr>
             <a:spLocks noGrp="1"/>
           </p:cNvSpPr>
@@ -1138,7 +1009,7 @@
           <a:p>
             <a:fld id="{883ECEF7-B6E9-49C4-83BF-168FC5D45A15}" type="datetimeFigureOut">
               <a:rPr lang="de-DE" smtClean="0"/>
-              <a:t>22.08.2025</a:t>
+              <a:t>24.08.2025</a:t>
             </a:fld>
             <a:endParaRPr lang="de-DE"/>
           </a:p>
@@ -1146,13 +1017,7 @@
       </p:sp>
       <p:sp>
         <p:nvSpPr>
-          <p:cNvPr id="5" name="Fußzeilenplatzhalter 4">
-            <a:extLst>
-              <a:ext uri="{FF2B5EF4-FFF2-40B4-BE49-F238E27FC236}">
-                <a16:creationId xmlns:a16="http://schemas.microsoft.com/office/drawing/2014/main" id="{D8CF8287-73C8-CCC4-8DDD-055D0AE31498}"/>
-              </a:ext>
-            </a:extLst>
-          </p:cNvPr>
+          <p:cNvPr id="5" name="Footer Placeholder 4"/>
           <p:cNvSpPr>
             <a:spLocks noGrp="1"/>
           </p:cNvSpPr>
@@ -1171,13 +1036,7 @@
       </p:sp>
       <p:sp>
         <p:nvSpPr>
-          <p:cNvPr id="6" name="Foliennummernplatzhalter 5">
-            <a:extLst>
-              <a:ext uri="{FF2B5EF4-FFF2-40B4-BE49-F238E27FC236}">
-                <a16:creationId xmlns:a16="http://schemas.microsoft.com/office/drawing/2014/main" id="{155B0AB9-BA0F-FC96-30E2-BD49E3F77E8B}"/>
-              </a:ext>
-            </a:extLst>
-          </p:cNvPr>
+          <p:cNvPr id="6" name="Slide Number Placeholder 5"/>
           <p:cNvSpPr>
             <a:spLocks noGrp="1"/>
           </p:cNvSpPr>
@@ -1201,7 +1060,7 @@
     </p:spTree>
     <p:extLst>
       <p:ext uri="{BB962C8B-B14F-4D97-AF65-F5344CB8AC3E}">
-        <p14:creationId xmlns:p14="http://schemas.microsoft.com/office/powerpoint/2010/main" val="621221388"/>
+        <p14:creationId xmlns:p14="http://schemas.microsoft.com/office/powerpoint/2010/main" val="563837456"/>
       </p:ext>
     </p:extLst>
   </p:cSld>
@@ -1230,13 +1089,7 @@
       </p:grpSpPr>
       <p:sp>
         <p:nvSpPr>
-          <p:cNvPr id="2" name="Titel 1">
-            <a:extLst>
-              <a:ext uri="{FF2B5EF4-FFF2-40B4-BE49-F238E27FC236}">
-                <a16:creationId xmlns:a16="http://schemas.microsoft.com/office/drawing/2014/main" id="{A9836751-6980-17B6-87CD-9603C02203DD}"/>
-              </a:ext>
-            </a:extLst>
-          </p:cNvPr>
+          <p:cNvPr id="2" name="Title 1"/>
           <p:cNvSpPr>
             <a:spLocks noGrp="1"/>
           </p:cNvSpPr>
@@ -1253,18 +1106,13 @@
               <a:rPr lang="de-DE"/>
               <a:t>Mastertitelformat bearbeiten</a:t>
             </a:r>
+            <a:endParaRPr lang="en-US" dirty="0"/>
           </a:p>
         </p:txBody>
       </p:sp>
       <p:sp>
         <p:nvSpPr>
-          <p:cNvPr id="3" name="Inhaltsplatzhalter 2">
-            <a:extLst>
-              <a:ext uri="{FF2B5EF4-FFF2-40B4-BE49-F238E27FC236}">
-                <a16:creationId xmlns:a16="http://schemas.microsoft.com/office/drawing/2014/main" id="{2786DFA0-E0DC-EB2B-3D78-A445C8DDE1FD}"/>
-              </a:ext>
-            </a:extLst>
-          </p:cNvPr>
+          <p:cNvPr id="3" name="Content Placeholder 2"/>
           <p:cNvSpPr>
             <a:spLocks noGrp="1"/>
           </p:cNvSpPr>
@@ -1274,8 +1122,8 @@
         </p:nvSpPr>
         <p:spPr>
           <a:xfrm>
-            <a:off x="838200" y="1825625"/>
-            <a:ext cx="5181600" cy="4351338"/>
+            <a:off x="838200" y="1916484"/>
+            <a:ext cx="5181600" cy="4567898"/>
           </a:xfrm>
         </p:spPr>
         <p:txBody>
@@ -1315,18 +1163,13 @@
               <a:rPr lang="de-DE"/>
               <a:t>Fünfte Ebene</a:t>
             </a:r>
+            <a:endParaRPr lang="en-US" dirty="0"/>
           </a:p>
         </p:txBody>
       </p:sp>
       <p:sp>
         <p:nvSpPr>
-          <p:cNvPr id="4" name="Inhaltsplatzhalter 3">
-            <a:extLst>
-              <a:ext uri="{FF2B5EF4-FFF2-40B4-BE49-F238E27FC236}">
-                <a16:creationId xmlns:a16="http://schemas.microsoft.com/office/drawing/2014/main" id="{5688BF1F-0636-EFC7-3BAB-2FC2B8787439}"/>
-              </a:ext>
-            </a:extLst>
-          </p:cNvPr>
+          <p:cNvPr id="4" name="Content Placeholder 3"/>
           <p:cNvSpPr>
             <a:spLocks noGrp="1"/>
           </p:cNvSpPr>
@@ -1336,8 +1179,8 @@
         </p:nvSpPr>
         <p:spPr>
           <a:xfrm>
-            <a:off x="6172200" y="1825625"/>
-            <a:ext cx="5181600" cy="4351338"/>
+            <a:off x="6172200" y="1916484"/>
+            <a:ext cx="5181600" cy="4567898"/>
           </a:xfrm>
         </p:spPr>
         <p:txBody>
@@ -1377,18 +1220,13 @@
               <a:rPr lang="de-DE"/>
               <a:t>Fünfte Ebene</a:t>
             </a:r>
+            <a:endParaRPr lang="en-US" dirty="0"/>
           </a:p>
         </p:txBody>
       </p:sp>
       <p:sp>
         <p:nvSpPr>
-          <p:cNvPr id="5" name="Datumsplatzhalter 4">
-            <a:extLst>
-              <a:ext uri="{FF2B5EF4-FFF2-40B4-BE49-F238E27FC236}">
-                <a16:creationId xmlns:a16="http://schemas.microsoft.com/office/drawing/2014/main" id="{A9C0F7F5-C0A2-AF25-EFF4-2BB547013766}"/>
-              </a:ext>
-            </a:extLst>
-          </p:cNvPr>
+          <p:cNvPr id="5" name="Date Placeholder 4"/>
           <p:cNvSpPr>
             <a:spLocks noGrp="1"/>
           </p:cNvSpPr>
@@ -1403,7 +1241,7 @@
           <a:p>
             <a:fld id="{883ECEF7-B6E9-49C4-83BF-168FC5D45A15}" type="datetimeFigureOut">
               <a:rPr lang="de-DE" smtClean="0"/>
-              <a:t>22.08.2025</a:t>
+              <a:t>24.08.2025</a:t>
             </a:fld>
             <a:endParaRPr lang="de-DE"/>
           </a:p>
@@ -1411,13 +1249,7 @@
       </p:sp>
       <p:sp>
         <p:nvSpPr>
-          <p:cNvPr id="6" name="Fußzeilenplatzhalter 5">
-            <a:extLst>
-              <a:ext uri="{FF2B5EF4-FFF2-40B4-BE49-F238E27FC236}">
-                <a16:creationId xmlns:a16="http://schemas.microsoft.com/office/drawing/2014/main" id="{7B294B56-DD66-6111-99C1-925AF6EE459D}"/>
-              </a:ext>
-            </a:extLst>
-          </p:cNvPr>
+          <p:cNvPr id="6" name="Footer Placeholder 5"/>
           <p:cNvSpPr>
             <a:spLocks noGrp="1"/>
           </p:cNvSpPr>
@@ -1436,13 +1268,7 @@
       </p:sp>
       <p:sp>
         <p:nvSpPr>
-          <p:cNvPr id="7" name="Foliennummernplatzhalter 6">
-            <a:extLst>
-              <a:ext uri="{FF2B5EF4-FFF2-40B4-BE49-F238E27FC236}">
-                <a16:creationId xmlns:a16="http://schemas.microsoft.com/office/drawing/2014/main" id="{B005B02A-A276-00EB-7A17-1F71678AEF3B}"/>
-              </a:ext>
-            </a:extLst>
-          </p:cNvPr>
+          <p:cNvPr id="7" name="Slide Number Placeholder 6"/>
           <p:cNvSpPr>
             <a:spLocks noGrp="1"/>
           </p:cNvSpPr>
@@ -1466,7 +1292,7 @@
     </p:spTree>
     <p:extLst>
       <p:ext uri="{BB962C8B-B14F-4D97-AF65-F5344CB8AC3E}">
-        <p14:creationId xmlns:p14="http://schemas.microsoft.com/office/powerpoint/2010/main" val="3508231718"/>
+        <p14:creationId xmlns:p14="http://schemas.microsoft.com/office/powerpoint/2010/main" val="1046910295"/>
       </p:ext>
     </p:extLst>
   </p:cSld>
@@ -1495,13 +1321,7 @@
       </p:grpSpPr>
       <p:sp>
         <p:nvSpPr>
-          <p:cNvPr id="2" name="Titel 1">
-            <a:extLst>
-              <a:ext uri="{FF2B5EF4-FFF2-40B4-BE49-F238E27FC236}">
-                <a16:creationId xmlns:a16="http://schemas.microsoft.com/office/drawing/2014/main" id="{5CC9BABA-0EF5-4B20-298B-334FDF68F438}"/>
-              </a:ext>
-            </a:extLst>
-          </p:cNvPr>
+          <p:cNvPr id="2" name="Title 1"/>
           <p:cNvSpPr>
             <a:spLocks noGrp="1"/>
           </p:cNvSpPr>
@@ -1511,8 +1331,8 @@
         </p:nvSpPr>
         <p:spPr>
           <a:xfrm>
-            <a:off x="839788" y="365125"/>
-            <a:ext cx="10515600" cy="1325563"/>
+            <a:off x="839788" y="383297"/>
+            <a:ext cx="10515600" cy="1391534"/>
           </a:xfrm>
         </p:spPr>
         <p:txBody>
@@ -1523,18 +1343,13 @@
               <a:rPr lang="de-DE"/>
               <a:t>Mastertitelformat bearbeiten</a:t>
             </a:r>
+            <a:endParaRPr lang="en-US" dirty="0"/>
           </a:p>
         </p:txBody>
       </p:sp>
       <p:sp>
         <p:nvSpPr>
-          <p:cNvPr id="3" name="Textplatzhalter 2">
-            <a:extLst>
-              <a:ext uri="{FF2B5EF4-FFF2-40B4-BE49-F238E27FC236}">
-                <a16:creationId xmlns:a16="http://schemas.microsoft.com/office/drawing/2014/main" id="{27D51543-CBA8-DA8C-B8AD-7FFCCC2667BD}"/>
-              </a:ext>
-            </a:extLst>
-          </p:cNvPr>
+          <p:cNvPr id="3" name="Text Placeholder 2"/>
           <p:cNvSpPr>
             <a:spLocks noGrp="1"/>
           </p:cNvSpPr>
@@ -1544,8 +1359,8 @@
         </p:nvSpPr>
         <p:spPr>
           <a:xfrm>
-            <a:off x="839788" y="1681163"/>
-            <a:ext cx="5157787" cy="823912"/>
+            <a:off x="839789" y="1764832"/>
+            <a:ext cx="5157787" cy="864917"/>
           </a:xfrm>
         </p:spPr>
         <p:txBody>
@@ -1599,13 +1414,7 @@
       </p:sp>
       <p:sp>
         <p:nvSpPr>
-          <p:cNvPr id="4" name="Inhaltsplatzhalter 3">
-            <a:extLst>
-              <a:ext uri="{FF2B5EF4-FFF2-40B4-BE49-F238E27FC236}">
-                <a16:creationId xmlns:a16="http://schemas.microsoft.com/office/drawing/2014/main" id="{FAB257BF-1301-1128-6B0F-1B2B203457A2}"/>
-              </a:ext>
-            </a:extLst>
-          </p:cNvPr>
+          <p:cNvPr id="4" name="Content Placeholder 3"/>
           <p:cNvSpPr>
             <a:spLocks noGrp="1"/>
           </p:cNvSpPr>
@@ -1615,8 +1424,8 @@
         </p:nvSpPr>
         <p:spPr>
           <a:xfrm>
-            <a:off x="839788" y="2505075"/>
-            <a:ext cx="5157787" cy="3684588"/>
+            <a:off x="839789" y="2629749"/>
+            <a:ext cx="5157787" cy="3867965"/>
           </a:xfrm>
         </p:spPr>
         <p:txBody>
@@ -1656,18 +1465,13 @@
               <a:rPr lang="de-DE"/>
               <a:t>Fünfte Ebene</a:t>
             </a:r>
+            <a:endParaRPr lang="en-US" dirty="0"/>
           </a:p>
         </p:txBody>
       </p:sp>
       <p:sp>
         <p:nvSpPr>
-          <p:cNvPr id="5" name="Textplatzhalter 4">
-            <a:extLst>
-              <a:ext uri="{FF2B5EF4-FFF2-40B4-BE49-F238E27FC236}">
-                <a16:creationId xmlns:a16="http://schemas.microsoft.com/office/drawing/2014/main" id="{27D7FF66-DC10-9F40-602D-F78687F5FDB2}"/>
-              </a:ext>
-            </a:extLst>
-          </p:cNvPr>
+          <p:cNvPr id="5" name="Text Placeholder 4"/>
           <p:cNvSpPr>
             <a:spLocks noGrp="1"/>
           </p:cNvSpPr>
@@ -1677,8 +1481,8 @@
         </p:nvSpPr>
         <p:spPr>
           <a:xfrm>
-            <a:off x="6172200" y="1681163"/>
-            <a:ext cx="5183188" cy="823912"/>
+            <a:off x="6172200" y="1764832"/>
+            <a:ext cx="5183188" cy="864917"/>
           </a:xfrm>
         </p:spPr>
         <p:txBody>
@@ -1732,13 +1536,7 @@
       </p:sp>
       <p:sp>
         <p:nvSpPr>
-          <p:cNvPr id="6" name="Inhaltsplatzhalter 5">
-            <a:extLst>
-              <a:ext uri="{FF2B5EF4-FFF2-40B4-BE49-F238E27FC236}">
-                <a16:creationId xmlns:a16="http://schemas.microsoft.com/office/drawing/2014/main" id="{0DCD8469-4A3B-F980-AB07-C86C179586F4}"/>
-              </a:ext>
-            </a:extLst>
-          </p:cNvPr>
+          <p:cNvPr id="6" name="Content Placeholder 5"/>
           <p:cNvSpPr>
             <a:spLocks noGrp="1"/>
           </p:cNvSpPr>
@@ -1748,8 +1546,8 @@
         </p:nvSpPr>
         <p:spPr>
           <a:xfrm>
-            <a:off x="6172200" y="2505075"/>
-            <a:ext cx="5183188" cy="3684588"/>
+            <a:off x="6172200" y="2629749"/>
+            <a:ext cx="5183188" cy="3867965"/>
           </a:xfrm>
         </p:spPr>
         <p:txBody>
@@ -1789,18 +1587,13 @@
               <a:rPr lang="de-DE"/>
               <a:t>Fünfte Ebene</a:t>
             </a:r>
+            <a:endParaRPr lang="en-US" dirty="0"/>
           </a:p>
         </p:txBody>
       </p:sp>
       <p:sp>
         <p:nvSpPr>
-          <p:cNvPr id="7" name="Datumsplatzhalter 6">
-            <a:extLst>
-              <a:ext uri="{FF2B5EF4-FFF2-40B4-BE49-F238E27FC236}">
-                <a16:creationId xmlns:a16="http://schemas.microsoft.com/office/drawing/2014/main" id="{4C2372AA-C8DE-89BF-FA64-5A27C858486D}"/>
-              </a:ext>
-            </a:extLst>
-          </p:cNvPr>
+          <p:cNvPr id="7" name="Date Placeholder 6"/>
           <p:cNvSpPr>
             <a:spLocks noGrp="1"/>
           </p:cNvSpPr>
@@ -1815,7 +1608,7 @@
           <a:p>
             <a:fld id="{883ECEF7-B6E9-49C4-83BF-168FC5D45A15}" type="datetimeFigureOut">
               <a:rPr lang="de-DE" smtClean="0"/>
-              <a:t>22.08.2025</a:t>
+              <a:t>24.08.2025</a:t>
             </a:fld>
             <a:endParaRPr lang="de-DE"/>
           </a:p>
@@ -1823,13 +1616,7 @@
       </p:sp>
       <p:sp>
         <p:nvSpPr>
-          <p:cNvPr id="8" name="Fußzeilenplatzhalter 7">
-            <a:extLst>
-              <a:ext uri="{FF2B5EF4-FFF2-40B4-BE49-F238E27FC236}">
-                <a16:creationId xmlns:a16="http://schemas.microsoft.com/office/drawing/2014/main" id="{B4C805A8-1B84-69AA-D34A-955CFF339AD5}"/>
-              </a:ext>
-            </a:extLst>
-          </p:cNvPr>
+          <p:cNvPr id="8" name="Footer Placeholder 7"/>
           <p:cNvSpPr>
             <a:spLocks noGrp="1"/>
           </p:cNvSpPr>
@@ -1848,13 +1635,7 @@
       </p:sp>
       <p:sp>
         <p:nvSpPr>
-          <p:cNvPr id="9" name="Foliennummernplatzhalter 8">
-            <a:extLst>
-              <a:ext uri="{FF2B5EF4-FFF2-40B4-BE49-F238E27FC236}">
-                <a16:creationId xmlns:a16="http://schemas.microsoft.com/office/drawing/2014/main" id="{ADDF6E42-97A8-A408-4A49-407536793E8E}"/>
-              </a:ext>
-            </a:extLst>
-          </p:cNvPr>
+          <p:cNvPr id="9" name="Slide Number Placeholder 8"/>
           <p:cNvSpPr>
             <a:spLocks noGrp="1"/>
           </p:cNvSpPr>
@@ -1878,7 +1659,7 @@
     </p:spTree>
     <p:extLst>
       <p:ext uri="{BB962C8B-B14F-4D97-AF65-F5344CB8AC3E}">
-        <p14:creationId xmlns:p14="http://schemas.microsoft.com/office/powerpoint/2010/main" val="1387749321"/>
+        <p14:creationId xmlns:p14="http://schemas.microsoft.com/office/powerpoint/2010/main" val="308138451"/>
       </p:ext>
     </p:extLst>
   </p:cSld>
@@ -1907,13 +1688,7 @@
       </p:grpSpPr>
       <p:sp>
         <p:nvSpPr>
-          <p:cNvPr id="2" name="Titel 1">
-            <a:extLst>
-              <a:ext uri="{FF2B5EF4-FFF2-40B4-BE49-F238E27FC236}">
-                <a16:creationId xmlns:a16="http://schemas.microsoft.com/office/drawing/2014/main" id="{7A9AFC99-A50F-6EB5-9D2D-F6647A484085}"/>
-              </a:ext>
-            </a:extLst>
-          </p:cNvPr>
+          <p:cNvPr id="2" name="Title 1"/>
           <p:cNvSpPr>
             <a:spLocks noGrp="1"/>
           </p:cNvSpPr>
@@ -1930,18 +1705,13 @@
               <a:rPr lang="de-DE"/>
               <a:t>Mastertitelformat bearbeiten</a:t>
             </a:r>
+            <a:endParaRPr lang="en-US" dirty="0"/>
           </a:p>
         </p:txBody>
       </p:sp>
       <p:sp>
         <p:nvSpPr>
-          <p:cNvPr id="3" name="Datumsplatzhalter 2">
-            <a:extLst>
-              <a:ext uri="{FF2B5EF4-FFF2-40B4-BE49-F238E27FC236}">
-                <a16:creationId xmlns:a16="http://schemas.microsoft.com/office/drawing/2014/main" id="{91AF024D-66D4-BFC3-F7BD-FFDAF0F2DF6E}"/>
-              </a:ext>
-            </a:extLst>
-          </p:cNvPr>
+          <p:cNvPr id="3" name="Date Placeholder 2"/>
           <p:cNvSpPr>
             <a:spLocks noGrp="1"/>
           </p:cNvSpPr>
@@ -1956,7 +1726,7 @@
           <a:p>
             <a:fld id="{883ECEF7-B6E9-49C4-83BF-168FC5D45A15}" type="datetimeFigureOut">
               <a:rPr lang="de-DE" smtClean="0"/>
-              <a:t>22.08.2025</a:t>
+              <a:t>24.08.2025</a:t>
             </a:fld>
             <a:endParaRPr lang="de-DE"/>
           </a:p>
@@ -1964,13 +1734,7 @@
       </p:sp>
       <p:sp>
         <p:nvSpPr>
-          <p:cNvPr id="4" name="Fußzeilenplatzhalter 3">
-            <a:extLst>
-              <a:ext uri="{FF2B5EF4-FFF2-40B4-BE49-F238E27FC236}">
-                <a16:creationId xmlns:a16="http://schemas.microsoft.com/office/drawing/2014/main" id="{14590886-92F8-C4A3-4635-8365C273106C}"/>
-              </a:ext>
-            </a:extLst>
-          </p:cNvPr>
+          <p:cNvPr id="4" name="Footer Placeholder 3"/>
           <p:cNvSpPr>
             <a:spLocks noGrp="1"/>
           </p:cNvSpPr>
@@ -1989,13 +1753,7 @@
       </p:sp>
       <p:sp>
         <p:nvSpPr>
-          <p:cNvPr id="5" name="Foliennummernplatzhalter 4">
-            <a:extLst>
-              <a:ext uri="{FF2B5EF4-FFF2-40B4-BE49-F238E27FC236}">
-                <a16:creationId xmlns:a16="http://schemas.microsoft.com/office/drawing/2014/main" id="{3885B1F2-6FD2-1588-1ABF-CE2A3E2A59B9}"/>
-              </a:ext>
-            </a:extLst>
-          </p:cNvPr>
+          <p:cNvPr id="5" name="Slide Number Placeholder 4"/>
           <p:cNvSpPr>
             <a:spLocks noGrp="1"/>
           </p:cNvSpPr>
@@ -2019,7 +1777,7 @@
     </p:spTree>
     <p:extLst>
       <p:ext uri="{BB962C8B-B14F-4D97-AF65-F5344CB8AC3E}">
-        <p14:creationId xmlns:p14="http://schemas.microsoft.com/office/powerpoint/2010/main" val="423762340"/>
+        <p14:creationId xmlns:p14="http://schemas.microsoft.com/office/powerpoint/2010/main" val="1445097989"/>
       </p:ext>
     </p:extLst>
   </p:cSld>
@@ -2048,13 +1806,7 @@
       </p:grpSpPr>
       <p:sp>
         <p:nvSpPr>
-          <p:cNvPr id="2" name="Datumsplatzhalter 1">
-            <a:extLst>
-              <a:ext uri="{FF2B5EF4-FFF2-40B4-BE49-F238E27FC236}">
-                <a16:creationId xmlns:a16="http://schemas.microsoft.com/office/drawing/2014/main" id="{E407A0DC-0617-FCB6-C828-B60824F5EC54}"/>
-              </a:ext>
-            </a:extLst>
-          </p:cNvPr>
+          <p:cNvPr id="2" name="Date Placeholder 1"/>
           <p:cNvSpPr>
             <a:spLocks noGrp="1"/>
           </p:cNvSpPr>
@@ -2069,7 +1821,7 @@
           <a:p>
             <a:fld id="{883ECEF7-B6E9-49C4-83BF-168FC5D45A15}" type="datetimeFigureOut">
               <a:rPr lang="de-DE" smtClean="0"/>
-              <a:t>22.08.2025</a:t>
+              <a:t>24.08.2025</a:t>
             </a:fld>
             <a:endParaRPr lang="de-DE"/>
           </a:p>
@@ -2077,13 +1829,7 @@
       </p:sp>
       <p:sp>
         <p:nvSpPr>
-          <p:cNvPr id="3" name="Fußzeilenplatzhalter 2">
-            <a:extLst>
-              <a:ext uri="{FF2B5EF4-FFF2-40B4-BE49-F238E27FC236}">
-                <a16:creationId xmlns:a16="http://schemas.microsoft.com/office/drawing/2014/main" id="{5EDDF694-2C40-E2CF-363F-ECE5BCDAEE63}"/>
-              </a:ext>
-            </a:extLst>
-          </p:cNvPr>
+          <p:cNvPr id="3" name="Footer Placeholder 2"/>
           <p:cNvSpPr>
             <a:spLocks noGrp="1"/>
           </p:cNvSpPr>
@@ -2102,13 +1848,7 @@
       </p:sp>
       <p:sp>
         <p:nvSpPr>
-          <p:cNvPr id="4" name="Foliennummernplatzhalter 3">
-            <a:extLst>
-              <a:ext uri="{FF2B5EF4-FFF2-40B4-BE49-F238E27FC236}">
-                <a16:creationId xmlns:a16="http://schemas.microsoft.com/office/drawing/2014/main" id="{5BC73358-C692-1766-B6A0-1B123A8443BF}"/>
-              </a:ext>
-            </a:extLst>
-          </p:cNvPr>
+          <p:cNvPr id="4" name="Slide Number Placeholder 3"/>
           <p:cNvSpPr>
             <a:spLocks noGrp="1"/>
           </p:cNvSpPr>
@@ -2132,7 +1872,7 @@
     </p:spTree>
     <p:extLst>
       <p:ext uri="{BB962C8B-B14F-4D97-AF65-F5344CB8AC3E}">
-        <p14:creationId xmlns:p14="http://schemas.microsoft.com/office/powerpoint/2010/main" val="3636091970"/>
+        <p14:creationId xmlns:p14="http://schemas.microsoft.com/office/powerpoint/2010/main" val="1142912263"/>
       </p:ext>
     </p:extLst>
   </p:cSld>
@@ -2161,13 +1901,7 @@
       </p:grpSpPr>
       <p:sp>
         <p:nvSpPr>
-          <p:cNvPr id="2" name="Titel 1">
-            <a:extLst>
-              <a:ext uri="{FF2B5EF4-FFF2-40B4-BE49-F238E27FC236}">
-                <a16:creationId xmlns:a16="http://schemas.microsoft.com/office/drawing/2014/main" id="{A829211B-BA8B-AFE4-5FF0-9116AE5ED245}"/>
-              </a:ext>
-            </a:extLst>
-          </p:cNvPr>
+          <p:cNvPr id="2" name="Title 1"/>
           <p:cNvSpPr>
             <a:spLocks noGrp="1"/>
           </p:cNvSpPr>
@@ -2177,8 +1911,8 @@
         </p:nvSpPr>
         <p:spPr>
           <a:xfrm>
-            <a:off x="839788" y="457200"/>
-            <a:ext cx="3932237" cy="1600200"/>
+            <a:off x="839789" y="479954"/>
+            <a:ext cx="3932237" cy="1679840"/>
           </a:xfrm>
         </p:spPr>
         <p:txBody>
@@ -2193,18 +1927,13 @@
               <a:rPr lang="de-DE"/>
               <a:t>Mastertitelformat bearbeiten</a:t>
             </a:r>
+            <a:endParaRPr lang="en-US" dirty="0"/>
           </a:p>
         </p:txBody>
       </p:sp>
       <p:sp>
         <p:nvSpPr>
-          <p:cNvPr id="3" name="Inhaltsplatzhalter 2">
-            <a:extLst>
-              <a:ext uri="{FF2B5EF4-FFF2-40B4-BE49-F238E27FC236}">
-                <a16:creationId xmlns:a16="http://schemas.microsoft.com/office/drawing/2014/main" id="{1E314C49-DDA1-52D7-6F21-DFE2410C309F}"/>
-              </a:ext>
-            </a:extLst>
-          </p:cNvPr>
+          <p:cNvPr id="3" name="Content Placeholder 2"/>
           <p:cNvSpPr>
             <a:spLocks noGrp="1"/>
           </p:cNvSpPr>
@@ -2214,8 +1943,8 @@
         </p:nvSpPr>
         <p:spPr>
           <a:xfrm>
-            <a:off x="5183188" y="987425"/>
-            <a:ext cx="6172200" cy="4873625"/>
+            <a:off x="5183188" y="1036569"/>
+            <a:ext cx="6172200" cy="5116178"/>
           </a:xfrm>
         </p:spPr>
         <p:txBody>
@@ -2283,18 +2012,13 @@
               <a:rPr lang="de-DE"/>
               <a:t>Fünfte Ebene</a:t>
             </a:r>
+            <a:endParaRPr lang="en-US" dirty="0"/>
           </a:p>
         </p:txBody>
       </p:sp>
       <p:sp>
         <p:nvSpPr>
-          <p:cNvPr id="4" name="Textplatzhalter 3">
-            <a:extLst>
-              <a:ext uri="{FF2B5EF4-FFF2-40B4-BE49-F238E27FC236}">
-                <a16:creationId xmlns:a16="http://schemas.microsoft.com/office/drawing/2014/main" id="{C8804269-4883-2878-67A0-A5F76AC0F17D}"/>
-              </a:ext>
-            </a:extLst>
-          </p:cNvPr>
+          <p:cNvPr id="4" name="Text Placeholder 3"/>
           <p:cNvSpPr>
             <a:spLocks noGrp="1"/>
           </p:cNvSpPr>
@@ -2304,8 +2028,8 @@
         </p:nvSpPr>
         <p:spPr>
           <a:xfrm>
-            <a:off x="839788" y="2057400"/>
-            <a:ext cx="3932237" cy="3811588"/>
+            <a:off x="839789" y="2159794"/>
+            <a:ext cx="3932237" cy="4001285"/>
           </a:xfrm>
         </p:spPr>
         <p:txBody>
@@ -2359,13 +2083,7 @@
       </p:sp>
       <p:sp>
         <p:nvSpPr>
-          <p:cNvPr id="5" name="Datumsplatzhalter 4">
-            <a:extLst>
-              <a:ext uri="{FF2B5EF4-FFF2-40B4-BE49-F238E27FC236}">
-                <a16:creationId xmlns:a16="http://schemas.microsoft.com/office/drawing/2014/main" id="{F2B335DD-99AF-006D-26EC-CA72C721DC0C}"/>
-              </a:ext>
-            </a:extLst>
-          </p:cNvPr>
+          <p:cNvPr id="5" name="Date Placeholder 4"/>
           <p:cNvSpPr>
             <a:spLocks noGrp="1"/>
           </p:cNvSpPr>
@@ -2380,7 +2098,7 @@
           <a:p>
             <a:fld id="{883ECEF7-B6E9-49C4-83BF-168FC5D45A15}" type="datetimeFigureOut">
               <a:rPr lang="de-DE" smtClean="0"/>
-              <a:t>22.08.2025</a:t>
+              <a:t>24.08.2025</a:t>
             </a:fld>
             <a:endParaRPr lang="de-DE"/>
           </a:p>
@@ -2388,13 +2106,7 @@
       </p:sp>
       <p:sp>
         <p:nvSpPr>
-          <p:cNvPr id="6" name="Fußzeilenplatzhalter 5">
-            <a:extLst>
-              <a:ext uri="{FF2B5EF4-FFF2-40B4-BE49-F238E27FC236}">
-                <a16:creationId xmlns:a16="http://schemas.microsoft.com/office/drawing/2014/main" id="{A84F906E-0C34-A5A3-33C4-43F8F69B7FA3}"/>
-              </a:ext>
-            </a:extLst>
-          </p:cNvPr>
+          <p:cNvPr id="6" name="Footer Placeholder 5"/>
           <p:cNvSpPr>
             <a:spLocks noGrp="1"/>
           </p:cNvSpPr>
@@ -2413,13 +2125,7 @@
       </p:sp>
       <p:sp>
         <p:nvSpPr>
-          <p:cNvPr id="7" name="Foliennummernplatzhalter 6">
-            <a:extLst>
-              <a:ext uri="{FF2B5EF4-FFF2-40B4-BE49-F238E27FC236}">
-                <a16:creationId xmlns:a16="http://schemas.microsoft.com/office/drawing/2014/main" id="{847612D4-28BE-8F5C-8841-16A763F2650A}"/>
-              </a:ext>
-            </a:extLst>
-          </p:cNvPr>
+          <p:cNvPr id="7" name="Slide Number Placeholder 6"/>
           <p:cNvSpPr>
             <a:spLocks noGrp="1"/>
           </p:cNvSpPr>
@@ -2443,7 +2149,7 @@
     </p:spTree>
     <p:extLst>
       <p:ext uri="{BB962C8B-B14F-4D97-AF65-F5344CB8AC3E}">
-        <p14:creationId xmlns:p14="http://schemas.microsoft.com/office/powerpoint/2010/main" val="22944603"/>
+        <p14:creationId xmlns:p14="http://schemas.microsoft.com/office/powerpoint/2010/main" val="3423753449"/>
       </p:ext>
     </p:extLst>
   </p:cSld>
@@ -2472,13 +2178,7 @@
       </p:grpSpPr>
       <p:sp>
         <p:nvSpPr>
-          <p:cNvPr id="2" name="Titel 1">
-            <a:extLst>
-              <a:ext uri="{FF2B5EF4-FFF2-40B4-BE49-F238E27FC236}">
-                <a16:creationId xmlns:a16="http://schemas.microsoft.com/office/drawing/2014/main" id="{C1C88CA5-7AA0-9B1B-FDA5-EADF6CAD86FD}"/>
-              </a:ext>
-            </a:extLst>
-          </p:cNvPr>
+          <p:cNvPr id="2" name="Title 1"/>
           <p:cNvSpPr>
             <a:spLocks noGrp="1"/>
           </p:cNvSpPr>
@@ -2488,8 +2188,8 @@
         </p:nvSpPr>
         <p:spPr>
           <a:xfrm>
-            <a:off x="839788" y="457200"/>
-            <a:ext cx="3932237" cy="1600200"/>
+            <a:off x="839789" y="479954"/>
+            <a:ext cx="3932237" cy="1679840"/>
           </a:xfrm>
         </p:spPr>
         <p:txBody>
@@ -2504,20 +2204,15 @@
               <a:rPr lang="de-DE"/>
               <a:t>Mastertitelformat bearbeiten</a:t>
             </a:r>
+            <a:endParaRPr lang="en-US" dirty="0"/>
           </a:p>
         </p:txBody>
       </p:sp>
       <p:sp>
         <p:nvSpPr>
-          <p:cNvPr id="3" name="Bildplatzhalter 2">
-            <a:extLst>
-              <a:ext uri="{FF2B5EF4-FFF2-40B4-BE49-F238E27FC236}">
-                <a16:creationId xmlns:a16="http://schemas.microsoft.com/office/drawing/2014/main" id="{FAB265DD-16D2-06FE-C2C5-EB26092323B0}"/>
-              </a:ext>
-            </a:extLst>
-          </p:cNvPr>
+          <p:cNvPr id="3" name="Picture Placeholder 2"/>
           <p:cNvSpPr>
-            <a:spLocks noGrp="1"/>
+            <a:spLocks noGrp="1" noChangeAspect="1"/>
           </p:cNvSpPr>
           <p:nvPr>
             <p:ph type="pic" idx="1"/>
@@ -2525,12 +2220,12 @@
         </p:nvSpPr>
         <p:spPr>
           <a:xfrm>
-            <a:off x="5183188" y="987425"/>
-            <a:ext cx="6172200" cy="4873625"/>
+            <a:off x="5183188" y="1036569"/>
+            <a:ext cx="6172200" cy="5116178"/>
           </a:xfrm>
         </p:spPr>
         <p:txBody>
-          <a:bodyPr/>
+          <a:bodyPr anchor="t"/>
           <a:lstStyle>
             <a:lvl1pPr marL="0" indent="0">
               <a:buNone/>
@@ -2570,19 +2265,17 @@
             </a:lvl9pPr>
           </a:lstStyle>
           <a:p>
-            <a:endParaRPr lang="de-DE"/>
+            <a:r>
+              <a:rPr lang="de-DE"/>
+              <a:t>Bild durch Klicken auf Symbol hinzufügen</a:t>
+            </a:r>
+            <a:endParaRPr lang="en-US" dirty="0"/>
           </a:p>
         </p:txBody>
       </p:sp>
       <p:sp>
         <p:nvSpPr>
-          <p:cNvPr id="4" name="Textplatzhalter 3">
-            <a:extLst>
-              <a:ext uri="{FF2B5EF4-FFF2-40B4-BE49-F238E27FC236}">
-                <a16:creationId xmlns:a16="http://schemas.microsoft.com/office/drawing/2014/main" id="{079D9692-673F-C255-0A01-7D05420C4B9D}"/>
-              </a:ext>
-            </a:extLst>
-          </p:cNvPr>
+          <p:cNvPr id="4" name="Text Placeholder 3"/>
           <p:cNvSpPr>
             <a:spLocks noGrp="1"/>
           </p:cNvSpPr>
@@ -2592,8 +2285,8 @@
         </p:nvSpPr>
         <p:spPr>
           <a:xfrm>
-            <a:off x="839788" y="2057400"/>
-            <a:ext cx="3932237" cy="3811588"/>
+            <a:off x="839789" y="2159794"/>
+            <a:ext cx="3932237" cy="4001285"/>
           </a:xfrm>
         </p:spPr>
         <p:txBody>
@@ -2647,13 +2340,7 @@
       </p:sp>
       <p:sp>
         <p:nvSpPr>
-          <p:cNvPr id="5" name="Datumsplatzhalter 4">
-            <a:extLst>
-              <a:ext uri="{FF2B5EF4-FFF2-40B4-BE49-F238E27FC236}">
-                <a16:creationId xmlns:a16="http://schemas.microsoft.com/office/drawing/2014/main" id="{215B8D31-108A-8064-7072-62D3DFB99D52}"/>
-              </a:ext>
-            </a:extLst>
-          </p:cNvPr>
+          <p:cNvPr id="5" name="Date Placeholder 4"/>
           <p:cNvSpPr>
             <a:spLocks noGrp="1"/>
           </p:cNvSpPr>
@@ -2668,7 +2355,7 @@
           <a:p>
             <a:fld id="{883ECEF7-B6E9-49C4-83BF-168FC5D45A15}" type="datetimeFigureOut">
               <a:rPr lang="de-DE" smtClean="0"/>
-              <a:t>22.08.2025</a:t>
+              <a:t>24.08.2025</a:t>
             </a:fld>
             <a:endParaRPr lang="de-DE"/>
           </a:p>
@@ -2676,13 +2363,7 @@
       </p:sp>
       <p:sp>
         <p:nvSpPr>
-          <p:cNvPr id="6" name="Fußzeilenplatzhalter 5">
-            <a:extLst>
-              <a:ext uri="{FF2B5EF4-FFF2-40B4-BE49-F238E27FC236}">
-                <a16:creationId xmlns:a16="http://schemas.microsoft.com/office/drawing/2014/main" id="{D10D9504-2BD4-B780-2E40-80F0E6DCBF05}"/>
-              </a:ext>
-            </a:extLst>
-          </p:cNvPr>
+          <p:cNvPr id="6" name="Footer Placeholder 5"/>
           <p:cNvSpPr>
             <a:spLocks noGrp="1"/>
           </p:cNvSpPr>
@@ -2701,13 +2382,7 @@
       </p:sp>
       <p:sp>
         <p:nvSpPr>
-          <p:cNvPr id="7" name="Foliennummernplatzhalter 6">
-            <a:extLst>
-              <a:ext uri="{FF2B5EF4-FFF2-40B4-BE49-F238E27FC236}">
-                <a16:creationId xmlns:a16="http://schemas.microsoft.com/office/drawing/2014/main" id="{D3CA7707-09FF-0DAD-1944-67E6DB9C1055}"/>
-              </a:ext>
-            </a:extLst>
-          </p:cNvPr>
+          <p:cNvPr id="7" name="Slide Number Placeholder 6"/>
           <p:cNvSpPr>
             <a:spLocks noGrp="1"/>
           </p:cNvSpPr>
@@ -2731,7 +2406,7 @@
     </p:spTree>
     <p:extLst>
       <p:ext uri="{BB962C8B-B14F-4D97-AF65-F5344CB8AC3E}">
-        <p14:creationId xmlns:p14="http://schemas.microsoft.com/office/powerpoint/2010/main" val="4145584921"/>
+        <p14:creationId xmlns:p14="http://schemas.microsoft.com/office/powerpoint/2010/main" val="3469001473"/>
       </p:ext>
     </p:extLst>
   </p:cSld>
@@ -2765,13 +2440,7 @@
       </p:grpSpPr>
       <p:sp>
         <p:nvSpPr>
-          <p:cNvPr id="2" name="Titelplatzhalter 1">
-            <a:extLst>
-              <a:ext uri="{FF2B5EF4-FFF2-40B4-BE49-F238E27FC236}">
-                <a16:creationId xmlns:a16="http://schemas.microsoft.com/office/drawing/2014/main" id="{3FBDCE01-42DB-9741-7C9D-4F0D5DFF558C}"/>
-              </a:ext>
-            </a:extLst>
-          </p:cNvPr>
+          <p:cNvPr id="2" name="Title Placeholder 1"/>
           <p:cNvSpPr>
             <a:spLocks noGrp="1"/>
           </p:cNvSpPr>
@@ -2781,8 +2450,8 @@
         </p:nvSpPr>
         <p:spPr>
           <a:xfrm>
-            <a:off x="838200" y="365125"/>
-            <a:ext cx="10515600" cy="1325563"/>
+            <a:off x="838200" y="383297"/>
+            <a:ext cx="10515600" cy="1391534"/>
           </a:xfrm>
           <a:prstGeom prst="rect">
             <a:avLst/>
@@ -2798,18 +2467,13 @@
               <a:rPr lang="de-DE"/>
               <a:t>Mastertitelformat bearbeiten</a:t>
             </a:r>
+            <a:endParaRPr lang="en-US" dirty="0"/>
           </a:p>
         </p:txBody>
       </p:sp>
       <p:sp>
         <p:nvSpPr>
-          <p:cNvPr id="3" name="Textplatzhalter 2">
-            <a:extLst>
-              <a:ext uri="{FF2B5EF4-FFF2-40B4-BE49-F238E27FC236}">
-                <a16:creationId xmlns:a16="http://schemas.microsoft.com/office/drawing/2014/main" id="{7C121591-093D-1237-A252-11EE1EEDD288}"/>
-              </a:ext>
-            </a:extLst>
-          </p:cNvPr>
+          <p:cNvPr id="3" name="Text Placeholder 2"/>
           <p:cNvSpPr>
             <a:spLocks noGrp="1"/>
           </p:cNvSpPr>
@@ -2819,8 +2483,8 @@
         </p:nvSpPr>
         <p:spPr>
           <a:xfrm>
-            <a:off x="838200" y="1825625"/>
-            <a:ext cx="10515600" cy="4351338"/>
+            <a:off x="838200" y="1916484"/>
+            <a:ext cx="10515600" cy="4567898"/>
           </a:xfrm>
           <a:prstGeom prst="rect">
             <a:avLst/>
@@ -2865,18 +2529,13 @@
               <a:rPr lang="de-DE"/>
               <a:t>Fünfte Ebene</a:t>
             </a:r>
+            <a:endParaRPr lang="en-US" dirty="0"/>
           </a:p>
         </p:txBody>
       </p:sp>
       <p:sp>
         <p:nvSpPr>
-          <p:cNvPr id="4" name="Datumsplatzhalter 3">
-            <a:extLst>
-              <a:ext uri="{FF2B5EF4-FFF2-40B4-BE49-F238E27FC236}">
-                <a16:creationId xmlns:a16="http://schemas.microsoft.com/office/drawing/2014/main" id="{31A5D621-A50A-813E-DEF7-36FB91077710}"/>
-              </a:ext>
-            </a:extLst>
-          </p:cNvPr>
+          <p:cNvPr id="4" name="Date Placeholder 3"/>
           <p:cNvSpPr>
             <a:spLocks noGrp="1"/>
           </p:cNvSpPr>
@@ -2886,8 +2545,8 @@
         </p:nvSpPr>
         <p:spPr>
           <a:xfrm>
-            <a:off x="838200" y="6356350"/>
-            <a:ext cx="2743200" cy="365125"/>
+            <a:off x="838200" y="6672697"/>
+            <a:ext cx="2743200" cy="383297"/>
           </a:xfrm>
           <a:prstGeom prst="rect">
             <a:avLst/>
@@ -2909,7 +2568,7 @@
           <a:p>
             <a:fld id="{883ECEF7-B6E9-49C4-83BF-168FC5D45A15}" type="datetimeFigureOut">
               <a:rPr lang="de-DE" smtClean="0"/>
-              <a:t>22.08.2025</a:t>
+              <a:t>24.08.2025</a:t>
             </a:fld>
             <a:endParaRPr lang="de-DE"/>
           </a:p>
@@ -2917,13 +2576,7 @@
       </p:sp>
       <p:sp>
         <p:nvSpPr>
-          <p:cNvPr id="5" name="Fußzeilenplatzhalter 4">
-            <a:extLst>
-              <a:ext uri="{FF2B5EF4-FFF2-40B4-BE49-F238E27FC236}">
-                <a16:creationId xmlns:a16="http://schemas.microsoft.com/office/drawing/2014/main" id="{BB6AB0FC-519D-C3A4-1EC1-10EB4B3C38F1}"/>
-              </a:ext>
-            </a:extLst>
-          </p:cNvPr>
+          <p:cNvPr id="5" name="Footer Placeholder 4"/>
           <p:cNvSpPr>
             <a:spLocks noGrp="1"/>
           </p:cNvSpPr>
@@ -2933,8 +2586,8 @@
         </p:nvSpPr>
         <p:spPr>
           <a:xfrm>
-            <a:off x="4038600" y="6356350"/>
-            <a:ext cx="4114800" cy="365125"/>
+            <a:off x="4038600" y="6672697"/>
+            <a:ext cx="4114800" cy="383297"/>
           </a:xfrm>
           <a:prstGeom prst="rect">
             <a:avLst/>
@@ -2960,13 +2613,7 @@
       </p:sp>
       <p:sp>
         <p:nvSpPr>
-          <p:cNvPr id="6" name="Foliennummernplatzhalter 5">
-            <a:extLst>
-              <a:ext uri="{FF2B5EF4-FFF2-40B4-BE49-F238E27FC236}">
-                <a16:creationId xmlns:a16="http://schemas.microsoft.com/office/drawing/2014/main" id="{F856957D-C573-BA0D-CAB8-774DD76AF3E1}"/>
-              </a:ext>
-            </a:extLst>
-          </p:cNvPr>
+          <p:cNvPr id="6" name="Slide Number Placeholder 5"/>
           <p:cNvSpPr>
             <a:spLocks noGrp="1"/>
           </p:cNvSpPr>
@@ -2976,8 +2623,8 @@
         </p:nvSpPr>
         <p:spPr>
           <a:xfrm>
-            <a:off x="8610600" y="6356350"/>
-            <a:ext cx="2743200" cy="365125"/>
+            <a:off x="8610600" y="6672697"/>
+            <a:ext cx="2743200" cy="383297"/>
           </a:xfrm>
           <a:prstGeom prst="rect">
             <a:avLst/>
@@ -3008,23 +2655,23 @@
     </p:spTree>
     <p:extLst>
       <p:ext uri="{BB962C8B-B14F-4D97-AF65-F5344CB8AC3E}">
-        <p14:creationId xmlns:p14="http://schemas.microsoft.com/office/powerpoint/2010/main" val="2048305683"/>
+        <p14:creationId xmlns:p14="http://schemas.microsoft.com/office/powerpoint/2010/main" val="1756365986"/>
       </p:ext>
     </p:extLst>
   </p:cSld>
   <p:clrMap bg1="lt1" tx1="dk1" bg2="lt2" tx2="dk2" accent1="accent1" accent2="accent2" accent3="accent3" accent4="accent4" accent5="accent5" accent6="accent6" hlink="hlink" folHlink="folHlink"/>
   <p:sldLayoutIdLst>
-    <p:sldLayoutId id="2147483649" r:id="rId1"/>
-    <p:sldLayoutId id="2147483650" r:id="rId2"/>
-    <p:sldLayoutId id="2147483651" r:id="rId3"/>
-    <p:sldLayoutId id="2147483652" r:id="rId4"/>
-    <p:sldLayoutId id="2147483653" r:id="rId5"/>
-    <p:sldLayoutId id="2147483654" r:id="rId6"/>
-    <p:sldLayoutId id="2147483655" r:id="rId7"/>
-    <p:sldLayoutId id="2147483656" r:id="rId8"/>
-    <p:sldLayoutId id="2147483657" r:id="rId9"/>
-    <p:sldLayoutId id="2147483658" r:id="rId10"/>
-    <p:sldLayoutId id="2147483659" r:id="rId11"/>
+    <p:sldLayoutId id="2147483661" r:id="rId1"/>
+    <p:sldLayoutId id="2147483662" r:id="rId2"/>
+    <p:sldLayoutId id="2147483663" r:id="rId3"/>
+    <p:sldLayoutId id="2147483664" r:id="rId4"/>
+    <p:sldLayoutId id="2147483665" r:id="rId5"/>
+    <p:sldLayoutId id="2147483666" r:id="rId6"/>
+    <p:sldLayoutId id="2147483667" r:id="rId7"/>
+    <p:sldLayoutId id="2147483668" r:id="rId8"/>
+    <p:sldLayoutId id="2147483669" r:id="rId9"/>
+    <p:sldLayoutId id="2147483670" r:id="rId10"/>
+    <p:sldLayoutId id="2147483671" r:id="rId11"/>
   </p:sldLayoutIdLst>
   <p:txStyles>
     <p:titleStyle>
@@ -3212,7 +2859,7 @@
     </p:bodyStyle>
     <p:otherStyle>
       <a:defPPr>
-        <a:defRPr lang="de-DE"/>
+        <a:defRPr lang="en-US"/>
       </a:defPPr>
       <a:lvl1pPr marL="0" algn="l" defTabSz="914400" rtl="0" eaLnBrk="1" latinLnBrk="0" hangingPunct="1">
         <a:defRPr sz="1800" kern="1200">
@@ -3351,8 +2998,8 @@
         </p:nvSpPr>
         <p:spPr>
           <a:xfrm>
-            <a:off x="-14535" y="-27384"/>
-            <a:ext cx="2927648" cy="6885384"/>
+            <a:off x="-24679" y="-28747"/>
+            <a:ext cx="2825468" cy="7228059"/>
           </a:xfrm>
           <a:prstGeom prst="rect">
             <a:avLst/>
@@ -3385,7 +3032,7 @@
           <a:lstStyle/>
           <a:p>
             <a:pPr algn="ctr"/>
-            <a:endParaRPr lang="de-DE"/>
+            <a:endParaRPr lang="de-DE" sz="1890" dirty="0"/>
           </a:p>
         </p:txBody>
       </p:sp>
@@ -3403,8 +3050,8 @@
         </p:nvSpPr>
         <p:spPr>
           <a:xfrm rot="762231" flipV="1">
-            <a:off x="-57361" y="2783622"/>
-            <a:ext cx="3012772" cy="3312559"/>
+            <a:off x="-363605" y="2922159"/>
+            <a:ext cx="3162713" cy="3477420"/>
           </a:xfrm>
           <a:custGeom>
             <a:avLst/>
@@ -3707,7 +3354,7 @@
           <a:lstStyle/>
           <a:p>
             <a:pPr algn="ctr"/>
-            <a:endParaRPr lang="de-DE" dirty="0"/>
+            <a:endParaRPr lang="de-DE" sz="1890" dirty="0"/>
           </a:p>
         </p:txBody>
       </p:sp>
@@ -3725,8 +3372,8 @@
         </p:nvSpPr>
         <p:spPr>
           <a:xfrm>
-            <a:off x="344156" y="330813"/>
-            <a:ext cx="9777396" cy="3779610"/>
+            <a:off x="57895" y="347277"/>
+            <a:ext cx="10264003" cy="3967716"/>
           </a:xfrm>
           <a:custGeom>
             <a:avLst/>
@@ -8591,7 +8238,7 @@
           <a:lstStyle/>
           <a:p>
             <a:pPr algn="ctr"/>
-            <a:endParaRPr lang="de-DE" dirty="0"/>
+            <a:endParaRPr lang="de-DE" sz="1890" dirty="0"/>
           </a:p>
         </p:txBody>
       </p:sp>
@@ -8609,8 +8256,8 @@
         </p:nvSpPr>
         <p:spPr>
           <a:xfrm>
-            <a:off x="7391016" y="-27384"/>
-            <a:ext cx="4019776" cy="836385"/>
+            <a:off x="7455467" y="-28747"/>
+            <a:ext cx="4219834" cy="878011"/>
           </a:xfrm>
           <a:custGeom>
             <a:avLst/>
@@ -9917,7 +9564,7 @@
           <a:lstStyle/>
           <a:p>
             <a:pPr algn="ctr"/>
-            <a:endParaRPr lang="de-DE" dirty="0"/>
+            <a:endParaRPr lang="de-DE" sz="1890" dirty="0"/>
           </a:p>
         </p:txBody>
       </p:sp>
@@ -9935,8 +9582,8 @@
         </p:nvSpPr>
         <p:spPr>
           <a:xfrm rot="5400000">
-            <a:off x="10420073" y="3987454"/>
-            <a:ext cx="2773156" cy="834571"/>
+            <a:off x="10335051" y="4185904"/>
+            <a:ext cx="2911172" cy="876106"/>
           </a:xfrm>
           <a:custGeom>
             <a:avLst/>
@@ -11159,7 +10806,7 @@
           <a:lstStyle/>
           <a:p>
             <a:pPr algn="ctr"/>
-            <a:endParaRPr lang="de-DE"/>
+            <a:endParaRPr lang="de-DE" sz="1890"/>
           </a:p>
         </p:txBody>
       </p:sp>
@@ -11177,8 +10824,8 @@
         </p:nvSpPr>
         <p:spPr>
           <a:xfrm>
-            <a:off x="8418876" y="155338"/>
-            <a:ext cx="1821972" cy="465350"/>
+            <a:off x="8534482" y="163069"/>
+            <a:ext cx="1912649" cy="488510"/>
           </a:xfrm>
           <a:prstGeom prst="roundRect">
             <a:avLst/>
@@ -11210,7 +10857,7 @@
           <a:lstStyle/>
           <a:p>
             <a:pPr algn="ctr"/>
-            <a:endParaRPr lang="de-DE"/>
+            <a:endParaRPr lang="de-DE" sz="1890"/>
           </a:p>
         </p:txBody>
       </p:sp>
@@ -11228,8 +10875,8 @@
         </p:nvSpPr>
         <p:spPr>
           <a:xfrm>
-            <a:off x="7520834" y="68136"/>
-            <a:ext cx="845040" cy="646331"/>
+            <a:off x="7601873" y="71527"/>
+            <a:ext cx="876970" cy="674031"/>
           </a:xfrm>
           <a:prstGeom prst="rect">
             <a:avLst/>
@@ -11244,23 +10891,23 @@
           <a:p>
             <a:pPr algn="r"/>
             <a:r>
-              <a:rPr lang="de-DE" dirty="0" err="1"/>
+              <a:rPr lang="de-DE" sz="1890" dirty="0" err="1"/>
               <a:t>logged</a:t>
             </a:r>
-            <a:endParaRPr lang="de-DE" dirty="0"/>
+            <a:endParaRPr lang="de-DE" sz="1890" dirty="0"/>
           </a:p>
           <a:p>
             <a:pPr algn="r"/>
             <a:r>
-              <a:rPr lang="de-DE" dirty="0"/>
+              <a:rPr lang="de-DE" sz="1890" dirty="0"/>
               <a:t>in </a:t>
             </a:r>
             <a:r>
-              <a:rPr lang="de-DE" dirty="0" err="1"/>
+              <a:rPr lang="de-DE" sz="1890" dirty="0" err="1"/>
               <a:t>as</a:t>
             </a:r>
             <a:r>
-              <a:rPr lang="de-DE" dirty="0"/>
+              <a:rPr lang="de-DE" sz="1890" dirty="0"/>
               <a:t> </a:t>
             </a:r>
           </a:p>
@@ -11280,8 +10927,8 @@
         </p:nvSpPr>
         <p:spPr>
           <a:xfrm>
-            <a:off x="5253110" y="1189092"/>
-            <a:ext cx="1117164" cy="432048"/>
+            <a:off x="5211160" y="1248271"/>
+            <a:ext cx="1172764" cy="453550"/>
           </a:xfrm>
           <a:prstGeom prst="roundRect">
             <a:avLst/>
@@ -11314,53 +10961,23 @@
           <a:bodyPr rtlCol="0" anchor="ctr"/>
           <a:lstStyle/>
           <a:p>
-            <a:pPr marL="0" marR="0" lvl="0" indent="0" algn="ctr" defTabSz="914400" rtl="0" eaLnBrk="1" fontAlgn="auto" latinLnBrk="0" hangingPunct="1">
-              <a:lnSpc>
-                <a:spcPct val="100000"/>
-              </a:lnSpc>
-              <a:spcBef>
-                <a:spcPts val="0"/>
-              </a:spcBef>
-              <a:spcAft>
-                <a:spcPts val="0"/>
-              </a:spcAft>
-              <a:buClrTx/>
-              <a:buSzTx/>
-              <a:buFontTx/>
-              <a:buNone/>
-              <a:tabLst/>
+            <a:pPr algn="ctr" defTabSz="959937">
               <a:defRPr/>
             </a:pPr>
             <a:r>
-              <a:rPr kumimoji="0" lang="de-DE" b="0" i="0" u="none" strike="noStrike" kern="1200" cap="none" spc="0" normalizeH="0" baseline="0" noProof="0" dirty="0" err="1">
-                <a:ln>
-                  <a:noFill/>
-                </a:ln>
+              <a:rPr lang="de-DE" sz="1890">
                 <a:solidFill>
                   <a:schemeClr val="bg1"/>
                 </a:solidFill>
-                <a:effectLst/>
-                <a:uLnTx/>
-                <a:uFillTx/>
                 <a:latin typeface="Aptos" panose="02110004020202020204"/>
-                <a:ea typeface="+mn-ea"/>
-                <a:cs typeface="+mn-cs"/>
               </a:rPr>
               <a:t>Stop</a:t>
             </a:r>
-            <a:endParaRPr kumimoji="0" lang="de-DE" b="0" i="0" u="none" strike="noStrike" kern="1200" cap="none" spc="0" normalizeH="0" baseline="0" noProof="0" dirty="0">
-              <a:ln>
-                <a:noFill/>
-              </a:ln>
+            <a:endParaRPr lang="de-DE" sz="1890" dirty="0">
               <a:solidFill>
                 <a:schemeClr val="bg1"/>
               </a:solidFill>
-              <a:effectLst/>
-              <a:uLnTx/>
-              <a:uFillTx/>
               <a:latin typeface="Aptos" panose="02110004020202020204"/>
-              <a:ea typeface="+mn-ea"/>
-              <a:cs typeface="+mn-cs"/>
             </a:endParaRPr>
           </a:p>
         </p:txBody>
@@ -11379,8 +10996,8 @@
         </p:nvSpPr>
         <p:spPr>
           <a:xfrm>
-            <a:off x="6548368" y="1565023"/>
-            <a:ext cx="1117164" cy="432048"/>
+            <a:off x="6570881" y="1642912"/>
+            <a:ext cx="1172764" cy="453550"/>
           </a:xfrm>
           <a:prstGeom prst="roundRect">
             <a:avLst/>
@@ -11413,37 +11030,15 @@
           <a:bodyPr rtlCol="0" anchor="ctr"/>
           <a:lstStyle/>
           <a:p>
-            <a:pPr marL="0" marR="0" lvl="0" indent="0" algn="ctr" defTabSz="914400" rtl="0" eaLnBrk="1" fontAlgn="auto" latinLnBrk="0" hangingPunct="1">
-              <a:lnSpc>
-                <a:spcPct val="100000"/>
-              </a:lnSpc>
-              <a:spcBef>
-                <a:spcPts val="0"/>
-              </a:spcBef>
-              <a:spcAft>
-                <a:spcPts val="0"/>
-              </a:spcAft>
-              <a:buClrTx/>
-              <a:buSzTx/>
-              <a:buFontTx/>
-              <a:buNone/>
-              <a:tabLst/>
+            <a:pPr algn="ctr" defTabSz="959937">
               <a:defRPr/>
             </a:pPr>
             <a:r>
-              <a:rPr kumimoji="0" lang="de-DE" b="0" i="0" u="none" strike="noStrike" kern="1200" cap="none" spc="0" normalizeH="0" baseline="0" noProof="0" dirty="0">
-                <a:ln>
-                  <a:noFill/>
-                </a:ln>
+              <a:rPr lang="de-DE" sz="1890" dirty="0">
                 <a:solidFill>
                   <a:schemeClr val="bg1"/>
                 </a:solidFill>
-                <a:effectLst/>
-                <a:uLnTx/>
-                <a:uFillTx/>
                 <a:latin typeface="Aptos" panose="02110004020202020204"/>
-                <a:ea typeface="+mn-ea"/>
-                <a:cs typeface="+mn-cs"/>
               </a:rPr>
               <a:t>Start</a:t>
             </a:r>
@@ -11464,8 +11059,8 @@
         </p:nvSpPr>
         <p:spPr>
           <a:xfrm>
-            <a:off x="7859156" y="1564732"/>
-            <a:ext cx="1909252" cy="432048"/>
+            <a:off x="7946905" y="1642606"/>
+            <a:ext cx="2004273" cy="453550"/>
           </a:xfrm>
           <a:prstGeom prst="roundRect">
             <a:avLst/>
@@ -11505,54 +11100,24 @@
           <a:bodyPr rtlCol="0" anchor="ctr"/>
           <a:lstStyle/>
           <a:p>
-            <a:pPr marL="0" marR="0" lvl="0" indent="0" algn="ctr" defTabSz="914400" rtl="0" eaLnBrk="1" fontAlgn="auto" latinLnBrk="0" hangingPunct="1">
-              <a:lnSpc>
-                <a:spcPct val="100000"/>
-              </a:lnSpc>
-              <a:spcBef>
-                <a:spcPts val="0"/>
-              </a:spcBef>
-              <a:spcAft>
-                <a:spcPts val="0"/>
-              </a:spcAft>
-              <a:buClrTx/>
-              <a:buSzTx/>
-              <a:buFontTx/>
-              <a:buNone/>
-              <a:tabLst/>
+            <a:pPr algn="ctr" defTabSz="959937">
               <a:defRPr/>
             </a:pPr>
             <a:r>
-              <a:rPr kumimoji="0" lang="de-DE" b="0" i="0" u="none" strike="noStrike" kern="1200" cap="none" spc="0" normalizeH="0" baseline="0" noProof="0" dirty="0" err="1">
-                <a:ln>
-                  <a:noFill/>
-                </a:ln>
+              <a:rPr lang="de-DE" sz="1890" dirty="0" err="1">
                 <a:solidFill>
                   <a:schemeClr val="bg1"/>
                 </a:solidFill>
-                <a:effectLst/>
-                <a:uLnTx/>
-                <a:uFillTx/>
                 <a:latin typeface="Aptos" panose="02110004020202020204"/>
-                <a:ea typeface="+mn-ea"/>
-                <a:cs typeface="+mn-cs"/>
               </a:rPr>
               <a:t>Stop</a:t>
             </a:r>
             <a:r>
-              <a:rPr kumimoji="0" lang="de-DE" b="0" i="0" u="none" strike="noStrike" kern="1200" cap="none" spc="0" normalizeH="0" baseline="0" noProof="0" dirty="0">
-                <a:ln>
-                  <a:noFill/>
-                </a:ln>
+              <a:rPr lang="de-DE" sz="1890" dirty="0">
                 <a:solidFill>
                   <a:schemeClr val="bg1"/>
                 </a:solidFill>
-                <a:effectLst/>
-                <a:uLnTx/>
-                <a:uFillTx/>
                 <a:latin typeface="Aptos" panose="02110004020202020204"/>
-                <a:ea typeface="+mn-ea"/>
-                <a:cs typeface="+mn-cs"/>
               </a:rPr>
               <a:t> and Restart</a:t>
             </a:r>
@@ -11573,8 +11138,8 @@
         </p:nvSpPr>
         <p:spPr>
           <a:xfrm>
-            <a:off x="3284590" y="2563812"/>
-            <a:ext cx="7481147" cy="3963375"/>
+            <a:off x="3144671" y="2691410"/>
+            <a:ext cx="7853473" cy="4160626"/>
           </a:xfrm>
           <a:prstGeom prst="roundRect">
             <a:avLst>
@@ -11609,7 +11174,7 @@
           <a:lstStyle/>
           <a:p>
             <a:pPr algn="ctr"/>
-            <a:endParaRPr lang="de-DE"/>
+            <a:endParaRPr lang="de-DE" sz="1890"/>
           </a:p>
         </p:txBody>
       </p:sp>
@@ -11627,8 +11192,8 @@
         </p:nvSpPr>
         <p:spPr>
           <a:xfrm>
-            <a:off x="973717" y="638421"/>
-            <a:ext cx="996684" cy="400110"/>
+            <a:off x="731588" y="670194"/>
+            <a:ext cx="1033488" cy="415498"/>
           </a:xfrm>
           <a:prstGeom prst="rect">
             <a:avLst/>
@@ -11643,10 +11208,10 @@
           <a:p>
             <a:pPr algn="r"/>
             <a:r>
-              <a:rPr lang="de-DE" sz="2000" dirty="0" err="1"/>
+              <a:rPr lang="de-DE" sz="2100" dirty="0" err="1"/>
               <a:t>Started</a:t>
             </a:r>
-            <a:endParaRPr lang="de-DE" sz="2000" dirty="0"/>
+            <a:endParaRPr lang="de-DE" sz="2100" dirty="0"/>
           </a:p>
         </p:txBody>
       </p:sp>
@@ -11664,8 +11229,8 @@
         </p:nvSpPr>
         <p:spPr>
           <a:xfrm>
-            <a:off x="4855205" y="648739"/>
-            <a:ext cx="1123320" cy="400110"/>
+            <a:off x="4799858" y="681025"/>
+            <a:ext cx="1172821" cy="415498"/>
           </a:xfrm>
           <a:prstGeom prst="rect">
             <a:avLst/>
@@ -11680,10 +11245,10 @@
           <a:p>
             <a:pPr algn="r"/>
             <a:r>
-              <a:rPr lang="de-DE" sz="2000" dirty="0" err="1"/>
+              <a:rPr lang="de-DE" sz="2100" dirty="0" err="1"/>
               <a:t>Finished</a:t>
             </a:r>
-            <a:endParaRPr lang="de-DE" sz="2000" dirty="0"/>
+            <a:endParaRPr lang="de-DE" sz="2100" dirty="0"/>
           </a:p>
         </p:txBody>
       </p:sp>
@@ -11701,8 +11266,8 @@
         </p:nvSpPr>
         <p:spPr>
           <a:xfrm>
-            <a:off x="3846386" y="1180746"/>
-            <a:ext cx="1079143" cy="400110"/>
+            <a:off x="3744854" y="1239510"/>
+            <a:ext cx="1122423" cy="415498"/>
           </a:xfrm>
           <a:prstGeom prst="rect">
             <a:avLst/>
@@ -11717,10 +11282,10 @@
           <a:p>
             <a:pPr algn="r"/>
             <a:r>
-              <a:rPr lang="de-DE" sz="2000" dirty="0" err="1"/>
+              <a:rPr lang="de-DE" sz="2100" dirty="0" err="1"/>
               <a:t>Elapsed</a:t>
             </a:r>
-            <a:endParaRPr lang="de-DE" sz="2000" dirty="0"/>
+            <a:endParaRPr lang="de-DE" sz="2100" dirty="0"/>
           </a:p>
         </p:txBody>
       </p:sp>
@@ -11738,8 +11303,8 @@
         </p:nvSpPr>
         <p:spPr>
           <a:xfrm>
-            <a:off x="2505012" y="1141244"/>
-            <a:ext cx="1368958" cy="433412"/>
+            <a:off x="2326294" y="1198042"/>
+            <a:ext cx="1437089" cy="454982"/>
           </a:xfrm>
           <a:prstGeom prst="roundRect">
             <a:avLst/>
@@ -11771,7 +11336,7 @@
           <a:lstStyle/>
           <a:p>
             <a:pPr algn="ctr"/>
-            <a:endParaRPr lang="de-DE" dirty="0"/>
+            <a:endParaRPr lang="de-DE" sz="1890" dirty="0"/>
           </a:p>
         </p:txBody>
       </p:sp>
@@ -11789,8 +11354,8 @@
         </p:nvSpPr>
         <p:spPr>
           <a:xfrm>
-            <a:off x="1990736" y="613308"/>
-            <a:ext cx="1368959" cy="433412"/>
+            <a:off x="1786424" y="643831"/>
+            <a:ext cx="1437090" cy="454982"/>
           </a:xfrm>
           <a:prstGeom prst="roundRect">
             <a:avLst/>
@@ -11822,7 +11387,7 @@
           <a:lstStyle/>
           <a:p>
             <a:pPr algn="ctr"/>
-            <a:endParaRPr lang="de-DE" dirty="0"/>
+            <a:endParaRPr lang="de-DE" sz="1890" dirty="0"/>
           </a:p>
         </p:txBody>
       </p:sp>
@@ -11840,8 +11405,8 @@
         </p:nvSpPr>
         <p:spPr>
           <a:xfrm>
-            <a:off x="10481792" y="80909"/>
-            <a:ext cx="612849" cy="597835"/>
+            <a:off x="10700067" y="84936"/>
+            <a:ext cx="643350" cy="627588"/>
           </a:xfrm>
           <a:prstGeom prst="ellipse">
             <a:avLst/>
@@ -11869,7 +11434,7 @@
           <a:lstStyle/>
           <a:p>
             <a:pPr algn="ctr"/>
-            <a:endParaRPr lang="de-DE"/>
+            <a:endParaRPr lang="de-DE" sz="1890"/>
           </a:p>
         </p:txBody>
       </p:sp>
@@ -11887,8 +11452,8 @@
         </p:nvSpPr>
         <p:spPr>
           <a:xfrm>
-            <a:off x="3524824" y="614672"/>
-            <a:ext cx="1368914" cy="433412"/>
+            <a:off x="3396860" y="645263"/>
+            <a:ext cx="1437043" cy="454982"/>
           </a:xfrm>
           <a:prstGeom prst="roundRect">
             <a:avLst/>
@@ -11920,7 +11485,7 @@
           <a:lstStyle/>
           <a:p>
             <a:pPr algn="ctr"/>
-            <a:endParaRPr lang="de-DE" dirty="0"/>
+            <a:endParaRPr lang="de-DE" sz="1890" dirty="0"/>
           </a:p>
         </p:txBody>
       </p:sp>
@@ -11938,8 +11503,8 @@
         </p:nvSpPr>
         <p:spPr>
           <a:xfrm>
-            <a:off x="639684" y="2515596"/>
-            <a:ext cx="1719713" cy="433412"/>
+            <a:off x="368132" y="2380394"/>
+            <a:ext cx="1805301" cy="454982"/>
           </a:xfrm>
           <a:prstGeom prst="roundRect">
             <a:avLst/>
@@ -11971,7 +11536,7 @@
           <a:lstStyle/>
           <a:p>
             <a:pPr algn="ctr"/>
-            <a:endParaRPr lang="de-DE" dirty="0"/>
+            <a:endParaRPr lang="de-DE" sz="1890" dirty="0"/>
           </a:p>
         </p:txBody>
       </p:sp>
@@ -11989,8 +11554,8 @@
         </p:nvSpPr>
         <p:spPr>
           <a:xfrm>
-            <a:off x="677352" y="1586138"/>
-            <a:ext cx="1719713" cy="433412"/>
+            <a:off x="395562" y="1531846"/>
+            <a:ext cx="1805301" cy="454982"/>
           </a:xfrm>
           <a:prstGeom prst="roundRect">
             <a:avLst/>
@@ -12022,7 +11587,7 @@
           <a:lstStyle/>
           <a:p>
             <a:pPr algn="ctr"/>
-            <a:endParaRPr lang="de-DE" dirty="0"/>
+            <a:endParaRPr lang="de-DE" sz="1890" dirty="0"/>
           </a:p>
         </p:txBody>
       </p:sp>
@@ -12040,8 +11605,8 @@
         </p:nvSpPr>
         <p:spPr>
           <a:xfrm>
-            <a:off x="785298" y="1238864"/>
-            <a:ext cx="967317" cy="400110"/>
+            <a:off x="517206" y="1167288"/>
+            <a:ext cx="1007134" cy="415498"/>
           </a:xfrm>
           <a:prstGeom prst="rect">
             <a:avLst/>
@@ -12056,7 +11621,7 @@
           <a:p>
             <a:pPr algn="r"/>
             <a:r>
-              <a:rPr lang="de-DE" sz="2000" dirty="0"/>
+              <a:rPr lang="de-DE" sz="2100" dirty="0"/>
               <a:t>Project</a:t>
             </a:r>
           </a:p>
@@ -12076,8 +11641,8 @@
         </p:nvSpPr>
         <p:spPr>
           <a:xfrm>
-            <a:off x="780257" y="2154201"/>
-            <a:ext cx="840551" cy="400110"/>
+            <a:off x="525730" y="2001013"/>
+            <a:ext cx="872355" cy="415498"/>
           </a:xfrm>
           <a:prstGeom prst="rect">
             <a:avLst/>
@@ -12092,7 +11657,7 @@
           <a:p>
             <a:pPr algn="r"/>
             <a:r>
-              <a:rPr lang="de-DE" sz="2000" dirty="0"/>
+              <a:rPr lang="de-DE" sz="2100" dirty="0"/>
               <a:t>Ticket</a:t>
             </a:r>
           </a:p>
@@ -12112,8 +11677,8 @@
         </p:nvSpPr>
         <p:spPr>
           <a:xfrm>
-            <a:off x="463575" y="3501008"/>
-            <a:ext cx="1917012" cy="1968280"/>
+            <a:off x="183257" y="3287691"/>
+            <a:ext cx="2012419" cy="2066238"/>
           </a:xfrm>
           <a:prstGeom prst="roundRect">
             <a:avLst>
@@ -12147,7 +11712,7 @@
           <a:lstStyle/>
           <a:p>
             <a:pPr algn="ctr"/>
-            <a:endParaRPr lang="de-DE" dirty="0"/>
+            <a:endParaRPr lang="de-DE" sz="1890" dirty="0"/>
           </a:p>
         </p:txBody>
       </p:sp>
@@ -12165,8 +11730,8 @@
         </p:nvSpPr>
         <p:spPr>
           <a:xfrm>
-            <a:off x="664157" y="3125135"/>
-            <a:ext cx="1473480" cy="400110"/>
+            <a:off x="403035" y="2893111"/>
+            <a:ext cx="1537600" cy="415498"/>
           </a:xfrm>
           <a:prstGeom prst="rect">
             <a:avLst/>
@@ -12181,7 +11746,7 @@
           <a:p>
             <a:pPr algn="r"/>
             <a:r>
-              <a:rPr lang="de-DE" sz="2000" dirty="0"/>
+              <a:rPr lang="de-DE" sz="2100" dirty="0"/>
               <a:t>Description</a:t>
             </a:r>
           </a:p>
@@ -12201,8 +11766,8 @@
         </p:nvSpPr>
         <p:spPr>
           <a:xfrm>
-            <a:off x="759468" y="5679243"/>
-            <a:ext cx="1231267" cy="432048"/>
+            <a:off x="493877" y="5498146"/>
+            <a:ext cx="1292545" cy="453550"/>
           </a:xfrm>
           <a:prstGeom prst="roundRect">
             <a:avLst/>
@@ -12235,37 +11800,15 @@
           <a:bodyPr rtlCol="0" anchor="ctr"/>
           <a:lstStyle/>
           <a:p>
-            <a:pPr marL="0" marR="0" lvl="0" indent="0" algn="ctr" defTabSz="914400" rtl="0" eaLnBrk="1" fontAlgn="auto" latinLnBrk="0" hangingPunct="1">
-              <a:lnSpc>
-                <a:spcPct val="100000"/>
-              </a:lnSpc>
-              <a:spcBef>
-                <a:spcPts val="0"/>
-              </a:spcBef>
-              <a:spcAft>
-                <a:spcPts val="0"/>
-              </a:spcAft>
-              <a:buClrTx/>
-              <a:buSzTx/>
-              <a:buFontTx/>
-              <a:buNone/>
-              <a:tabLst/>
+            <a:pPr algn="ctr" defTabSz="959937">
               <a:defRPr/>
             </a:pPr>
             <a:r>
-              <a:rPr kumimoji="0" lang="de-DE" b="0" i="0" u="none" strike="noStrike" kern="1200" cap="none" spc="0" normalizeH="0" baseline="0" noProof="0" dirty="0">
-                <a:ln>
-                  <a:noFill/>
-                </a:ln>
+              <a:rPr lang="de-DE" sz="1890" dirty="0">
                 <a:solidFill>
                   <a:schemeClr val="bg1"/>
                 </a:solidFill>
-                <a:effectLst/>
-                <a:uLnTx/>
-                <a:uFillTx/>
                 <a:latin typeface="Aptos" panose="02110004020202020204"/>
-                <a:ea typeface="+mn-ea"/>
-                <a:cs typeface="+mn-cs"/>
               </a:rPr>
               <a:t>Export</a:t>
             </a:r>
@@ -12286,8 +11829,8 @@
         </p:nvSpPr>
         <p:spPr>
           <a:xfrm>
-            <a:off x="768225" y="6240506"/>
-            <a:ext cx="1231267" cy="432048"/>
+            <a:off x="503070" y="6080266"/>
+            <a:ext cx="1292545" cy="453550"/>
           </a:xfrm>
           <a:prstGeom prst="roundRect">
             <a:avLst/>
@@ -12320,39 +11863,80 @@
           <a:bodyPr rtlCol="0" anchor="ctr"/>
           <a:lstStyle/>
           <a:p>
-            <a:pPr marL="0" marR="0" lvl="0" indent="0" algn="ctr" defTabSz="914400" rtl="0" eaLnBrk="1" fontAlgn="auto" latinLnBrk="0" hangingPunct="1">
-              <a:lnSpc>
-                <a:spcPct val="100000"/>
-              </a:lnSpc>
-              <a:spcBef>
-                <a:spcPts val="0"/>
-              </a:spcBef>
-              <a:spcAft>
-                <a:spcPts val="0"/>
-              </a:spcAft>
-              <a:buClrTx/>
-              <a:buSzTx/>
-              <a:buFontTx/>
-              <a:buNone/>
-              <a:tabLst/>
+            <a:pPr algn="ctr" defTabSz="959937">
               <a:defRPr/>
             </a:pPr>
             <a:r>
-              <a:rPr kumimoji="0" lang="de-DE" b="0" i="0" u="none" strike="noStrike" kern="1200" cap="none" spc="0" normalizeH="0" baseline="0" noProof="0" dirty="0">
-                <a:ln>
-                  <a:noFill/>
-                </a:ln>
+              <a:rPr lang="de-DE" sz="1890" dirty="0">
                 <a:solidFill>
                   <a:schemeClr val="bg1"/>
                 </a:solidFill>
-                <a:effectLst/>
-                <a:uLnTx/>
-                <a:uFillTx/>
                 <a:latin typeface="Aptos" panose="02110004020202020204"/>
-                <a:ea typeface="+mn-ea"/>
-                <a:cs typeface="+mn-cs"/>
               </a:rPr>
               <a:t>Import</a:t>
+            </a:r>
+          </a:p>
+        </p:txBody>
+      </p:sp>
+      <p:sp>
+        <p:nvSpPr>
+          <p:cNvPr id="3" name="Rechteck: abgerundete Ecken 2">
+            <a:extLst>
+              <a:ext uri="{FF2B5EF4-FFF2-40B4-BE49-F238E27FC236}">
+                <a16:creationId xmlns:a16="http://schemas.microsoft.com/office/drawing/2014/main" id="{F1D323AB-958B-CFC2-19EC-79529007D284}"/>
+              </a:ext>
+            </a:extLst>
+          </p:cNvPr>
+          <p:cNvSpPr/>
+          <p:nvPr/>
+        </p:nvSpPr>
+        <p:spPr>
+          <a:xfrm>
+            <a:off x="497544" y="6656330"/>
+            <a:ext cx="1292545" cy="453550"/>
+          </a:xfrm>
+          <a:prstGeom prst="roundRect">
+            <a:avLst/>
+          </a:prstGeom>
+          <a:solidFill>
+            <a:schemeClr val="tx1">
+              <a:lumMod val="50000"/>
+              <a:lumOff val="50000"/>
+            </a:schemeClr>
+          </a:solidFill>
+          <a:ln w="34925" cmpd="thickThin"/>
+        </p:spPr>
+        <p:style>
+          <a:lnRef idx="2">
+            <a:schemeClr val="accent1">
+              <a:shade val="15000"/>
+            </a:schemeClr>
+          </a:lnRef>
+          <a:fillRef idx="1">
+            <a:schemeClr val="accent1"/>
+          </a:fillRef>
+          <a:effectRef idx="0">
+            <a:schemeClr val="accent1"/>
+          </a:effectRef>
+          <a:fontRef idx="minor">
+            <a:schemeClr val="lt1"/>
+          </a:fontRef>
+        </p:style>
+        <p:txBody>
+          <a:bodyPr rtlCol="0" anchor="ctr"/>
+          <a:lstStyle/>
+          <a:p>
+            <a:pPr algn="ctr" defTabSz="959937">
+              <a:defRPr/>
+            </a:pPr>
+            <a:r>
+              <a:rPr lang="de-DE" sz="1890" dirty="0">
+                <a:solidFill>
+                  <a:schemeClr val="bg1"/>
+                </a:solidFill>
+                <a:latin typeface="Aptos" panose="02110004020202020204"/>
+              </a:rPr>
+              <a:t>Edit File</a:t>
             </a:r>
           </a:p>
         </p:txBody>

</xml_diff>